<commit_message>
Photon RPC Tutorial Renewal
- Set to receive the position of the
  crystal-generated object at
  random using the transform array

- Photon RPC material update
</commit_message>
<xml_diff>
--- a/Assets/Class/Photon Server/PPT Data/Photon Synchronization.pptx
+++ b/Assets/Class/Photon Server/PPT Data/Photon Synchronization.pptx
@@ -2,7 +2,7 @@
 <file path=ppt/presentation.xml><?xml version="1.0" encoding="utf-8"?>
 <p:presentation xmlns:a="http://schemas.openxmlformats.org/drawingml/2006/main" xmlns:r="http://schemas.openxmlformats.org/officeDocument/2006/relationships" xmlns:p="http://schemas.openxmlformats.org/presentationml/2006/main" xmlns:p14="http://schemas.microsoft.com/office/powerpoint/2010/main" saveSubsetFonts="1" firstSlideNum="0">
   <p:sldMasterIdLst>
-    <p:sldMasterId id="2147486888" r:id="rId12"/>
+    <p:sldMasterId id="2147486898" r:id="rId12"/>
   </p:sldMasterIdLst>
   <p:notesMasterIdLst>
     <p:notesMasterId r:id="rId14"/>
@@ -24,6 +24,7 @@
     <p:sldId id="320" r:id="rId29"/>
     <p:sldId id="321" r:id="rId30"/>
     <p:sldId id="322" r:id="rId31"/>
+    <p:sldId id="324" r:id="rId32"/>
   </p:sldIdLst>
   <p:sldSz cx="12192000" cy="6858000"/>
   <p:notesSz cx="6858000" cy="9144000"/>
@@ -1618,6 +1619,148 @@
 </p:notes>
 </file>
 
+<file path=ppt/notesSlides/notesSlide17.xml><?xml version="1.0" encoding="utf-8"?>
+<p:notes xmlns:a="http://schemas.openxmlformats.org/drawingml/2006/main" xmlns:r="http://schemas.openxmlformats.org/officeDocument/2006/relationships" xmlns:p="http://schemas.openxmlformats.org/presentationml/2006/main">
+  <p:cSld>
+    <p:spTree>
+      <p:nvGrpSpPr>
+        <p:cNvPr id="1" name=""/>
+        <p:cNvGrpSpPr/>
+        <p:nvPr/>
+      </p:nvGrpSpPr>
+      <p:grpSpPr>
+        <a:xfrm>
+          <a:off x="0" y="0"/>
+          <a:ext cx="0" cy="0"/>
+          <a:chOff x="0" y="0"/>
+          <a:chExt cx="0" cy="0"/>
+        </a:xfrm>
+      </p:grpSpPr>
+      <p:sp>
+        <p:nvSpPr>
+          <p:cNvPr id="2" name="슬라이드 이미지 개체 틀 3"/>
+          <p:cNvSpPr>
+            <a:spLocks noChangeAspect="1"/>
+          </p:cNvSpPr>
+          <p:nvPr>
+            <p:ph type="sldImg" idx="2"/>
+          </p:nvPr>
+        </p:nvSpPr>
+        <p:spPr>
+          <a:xfrm rot="0">
+            <a:off x="685800" y="1143000"/>
+            <a:ext cx="5494655" cy="3094355"/>
+          </a:xfrm>
+          <a:prstGeom prst="rect"/>
+          <a:noFill/>
+          <a:ln w="12700" cap="flat" cmpd="sng">
+            <a:solidFill>
+              <a:srgbClr val="000000">
+                <a:alpha val="100000"/>
+              </a:srgbClr>
+            </a:solidFill>
+            <a:prstDash val="solid"/>
+          </a:ln>
+        </p:spPr>
+        <p:txBody>
+          <a:bodyPr wrap="square" lIns="91440" tIns="45720" rIns="91440" bIns="45720" numCol="1" vert="horz" anchor="ctr">
+            <a:noAutofit/>
+          </a:bodyPr>
+          <a:lstStyle/>
+          <a:p>
+            <a:pPr marL="0" indent="0" latinLnBrk="0">
+              <a:buFontTx/>
+              <a:buNone/>
+            </a:pPr>
+          </a:p>
+        </p:txBody>
+      </p:sp>
+      <p:sp>
+        <p:nvSpPr>
+          <p:cNvPr id="3" name="슬라이드 노트 개체 틀 4"/>
+          <p:cNvSpPr txBox="1">
+            <a:spLocks/>
+          </p:cNvSpPr>
+          <p:nvPr>
+            <p:ph type="body" idx="3"/>
+          </p:nvPr>
+        </p:nvSpPr>
+        <p:spPr>
+          <a:xfrm rot="0">
+            <a:off x="685800" y="4400550"/>
+            <a:ext cx="5494655" cy="3608705"/>
+          </a:xfrm>
+          <a:prstGeom prst="rect"/>
+        </p:spPr>
+        <p:txBody>
+          <a:bodyPr wrap="square" lIns="91440" tIns="45720" rIns="91440" bIns="45720" numCol="1" vert="horz" anchor="t">
+            <a:noAutofit/>
+          </a:bodyPr>
+          <a:lstStyle/>
+          <a:p>
+            <a:pPr marL="0" indent="0" latinLnBrk="0">
+              <a:buFontTx/>
+              <a:buNone/>
+            </a:pPr>
+          </a:p>
+        </p:txBody>
+      </p:sp>
+      <p:sp>
+        <p:nvSpPr>
+          <p:cNvPr id="4" name="슬라이드 번호 개체 틀 6"/>
+          <p:cNvSpPr txBox="1">
+            <a:spLocks/>
+          </p:cNvSpPr>
+          <p:nvPr>
+            <p:ph type="sldNum" idx="5"/>
+          </p:nvPr>
+        </p:nvSpPr>
+        <p:spPr>
+          <a:xfrm rot="0">
+            <a:off x="3884930" y="8685530"/>
+            <a:ext cx="2980055" cy="466725"/>
+          </a:xfrm>
+          <a:prstGeom prst="rect"/>
+        </p:spPr>
+        <p:txBody>
+          <a:bodyPr wrap="square" lIns="91440" tIns="45720" rIns="91440" bIns="45720" numCol="1" vert="horz" anchor="b">
+            <a:noAutofit/>
+          </a:bodyPr>
+          <a:lstStyle>
+            <a:lvl1pPr marL="0" indent="0" algn="r" latinLnBrk="0">
+              <a:buFontTx/>
+              <a:buNone/>
+              <a:defRPr lang="en-GB" altLang="en-US" sz="1200"/>
+            </a:lvl1pPr>
+          </a:lstStyle>
+          <a:p>
+            <a:pPr marL="0" indent="0" latinLnBrk="0">
+              <a:buFontTx/>
+              <a:buNone/>
+            </a:pPr>
+            <a:fld id="{B9320F77-B9A0-41C5-862A-B4B631284C64}" type="slidenum">
+              <a:rPr lang="ko-KR" altLang="en-US"/>
+              <a:t>‹#›</a:t>
+            </a:fld>
+          </a:p>
+        </p:txBody>
+      </p:sp>
+    </p:spTree>
+  </p:cSld>
+  <p:clrMapOvr>
+    <a:masterClrMapping/>
+  </p:clrMapOvr>
+  <mc:AlternateContent xmlns:mc="http://schemas.openxmlformats.org/markup-compatibility/2006">
+    <mc:Choice xmlns:p14="http://schemas.microsoft.com/office/powerpoint/2010/main" Requires="p14">
+      <p:transition spd="slow" p14:dur="0"/>
+    </mc:Choice>
+    <mc:Fallback>
+      <p:transition spd="slow"/>
+    </mc:Fallback>
+  </mc:AlternateContent>
+</p:notes>
+</file>
+
 <file path=ppt/notesSlides/notesSlide2.xml><?xml version="1.0" encoding="utf-8"?>
 <p:notes xmlns:a="http://schemas.openxmlformats.org/drawingml/2006/main" xmlns:r="http://schemas.openxmlformats.org/officeDocument/2006/relationships" xmlns:p="http://schemas.openxmlformats.org/presentationml/2006/main">
   <p:cSld>
@@ -8455,7 +8598,7 @@
       </p:sp>
       <p:pic>
         <p:nvPicPr>
-          <p:cNvPr id="38" name="그림 57" descr="C:/Users/Admin1/AppData/Roaming/PolarisOffice/ETemp/7276_13419048/fImage318592564464.png"/>
+          <p:cNvPr id="38" name="그림 57"/>
           <p:cNvPicPr>
             <a:picLocks noChangeAspect="1"/>
           </p:cNvPicPr>
@@ -8484,7 +8627,7 @@
       </p:pic>
       <p:pic>
         <p:nvPicPr>
-          <p:cNvPr id="43" name="그림 70" descr="C:/Users/Admin1/AppData/Roaming/PolarisOffice/ETemp/7276_13419048/fImage376762648145.png"/>
+          <p:cNvPr id="43" name="그림 70"/>
           <p:cNvPicPr>
             <a:picLocks noChangeAspect="1"/>
           </p:cNvPicPr>
@@ -8649,7 +8792,7 @@
       </p:sp>
       <p:pic>
         <p:nvPicPr>
-          <p:cNvPr id="46" name="그림 34" descr="C:/Users/Admin1/AppData/Roaming/PolarisOffice/ETemp/7276_13419048/fImage71093116962.png"/>
+          <p:cNvPr id="46" name="그림 34"/>
           <p:cNvPicPr>
             <a:picLocks noChangeAspect="1"/>
           </p:cNvPicPr>
@@ -8712,7 +8855,7 @@
       </p:cxnSp>
       <p:pic>
         <p:nvPicPr>
-          <p:cNvPr id="47" name="그림 35" descr="C:/Users/Admin1/AppData/Roaming/PolarisOffice/ETemp/7276_13419048/fImage71093124464.png"/>
+          <p:cNvPr id="47" name="그림 35"/>
           <p:cNvPicPr>
             <a:picLocks noChangeAspect="1"/>
           </p:cNvPicPr>
@@ -9159,7 +9302,7 @@
       </p:pic>
       <p:pic>
         <p:nvPicPr>
-          <p:cNvPr id="49" name="그림 84" descr="C:/Users/Admin1/AppData/Roaming/PolarisOffice/ETemp/7276_13419048/fImage52992859961.png"/>
+          <p:cNvPr id="49" name="그림 84"/>
           <p:cNvPicPr>
             <a:picLocks noChangeAspect="1"/>
           </p:cNvPicPr>
@@ -9190,7 +9333,7 @@
       </p:pic>
       <p:pic>
         <p:nvPicPr>
-          <p:cNvPr id="50" name="그림 38" descr="C:/Users/Admin1/AppData/Roaming/PolarisOffice/ETemp/7276_13419048/fImage68982326962.png"/>
+          <p:cNvPr id="50" name="그림 38"/>
           <p:cNvPicPr>
             <a:picLocks noChangeAspect="1"/>
           </p:cNvPicPr>
@@ -9538,7 +9681,7 @@
       </p:pic>
       <p:pic>
         <p:nvPicPr>
-          <p:cNvPr id="54" name="그림 93" descr="C:/Users/Admin1/AppData/Roaming/PolarisOffice/ETemp/7276_13419048/fImage48473031942.png"/>
+          <p:cNvPr id="54" name="그림 93"/>
           <p:cNvPicPr>
             <a:picLocks noChangeAspect="1"/>
           </p:cNvPicPr>
@@ -9712,7 +9855,7 @@
       </p:sp>
       <p:pic>
         <p:nvPicPr>
-          <p:cNvPr id="56" name="그림 39" descr="C:/Users/Admin1/AppData/Roaming/PolarisOffice/ETemp/7276_13419048/fImage68982326962.png"/>
+          <p:cNvPr id="56" name="그림 39"/>
           <p:cNvPicPr>
             <a:picLocks noChangeAspect="1"/>
           </p:cNvPicPr>
@@ -9841,7 +9984,7 @@
       </p:sp>
       <p:pic>
         <p:nvPicPr>
-          <p:cNvPr id="57" name="그림 97"/>
+          <p:cNvPr id="57" name="그림 97" descr="C:/Users/Admin1/AppData/Roaming/PolarisOffice/ETemp/15444_16111816/fImage180123184827.png"/>
           <p:cNvPicPr>
             <a:picLocks noChangeAspect="1"/>
           </p:cNvPicPr>
@@ -9861,8 +10004,8 @@
         </p:blipFill>
         <p:spPr>
           <a:xfrm rot="0">
-            <a:off x="1222375" y="3034030"/>
-            <a:ext cx="4224020" cy="1198880"/>
+            <a:off x="1214120" y="2726690"/>
+            <a:ext cx="4164965" cy="2146935"/>
           </a:xfrm>
           <a:prstGeom prst="roundRect"/>
           <a:solidFill>
@@ -9879,9 +10022,9 @@
           <p:nvPr/>
         </p:nvSpPr>
         <p:spPr>
-          <a:xfrm>
-            <a:off x="1210310" y="4444365"/>
-            <a:ext cx="4244975" cy="1754505"/>
+          <a:xfrm rot="0">
+            <a:off x="1210310" y="5009515"/>
+            <a:ext cx="4168775" cy="1200785"/>
           </a:xfrm>
           <a:prstGeom prst="rect"/>
           <a:noFill/>
@@ -9908,97 +10051,88 @@
                 <a:latin typeface="맑은 고딕" charset="0"/>
                 <a:ea typeface="맑은 고딕" charset="0"/>
               </a:rPr>
-              <a:t>30</a:t>
-            </a:r>
-            <a:r>
-              <a:rPr sz="1800" b="1">
-                <a:solidFill>
-                  <a:srgbClr val="0611F2"/>
-                </a:solidFill>
-                <a:latin typeface="맑은 고딕" charset="0"/>
-                <a:ea typeface="맑은 고딕" charset="0"/>
-              </a:rPr>
-              <a:t>.</a:t>
+              <a:t>30.</a:t>
             </a:r>
             <a:r>
               <a:rPr sz="1800">
                 <a:latin typeface="맑은 고딕" charset="0"/>
                 <a:ea typeface="맑은 고딕" charset="0"/>
               </a:rPr>
-              <a:t> 마지막으로 Character 오브젝트</a:t>
+              <a:t> </a:t>
+            </a:r>
+            <a:r>
+              <a:rPr sz="1800">
+                <a:latin typeface="맑은 고딕" charset="0"/>
+                <a:ea typeface="맑은 고딕" charset="0"/>
+              </a:rPr>
+              <a:t>이</a:t>
             </a:r>
             <a:r>
               <a:rPr lang="ko-KR" sz="1800">
                 <a:latin typeface="맑은 고딕" charset="0"/>
                 <a:ea typeface="맑은 고딕" charset="0"/>
               </a:rPr>
-              <a:t>를 선택합니다.</a:t>
+              <a:t>제</a:t>
+            </a:r>
+            <a:r>
+              <a:rPr sz="1800">
+                <a:latin typeface="맑은 고딕" charset="0"/>
+                <a:ea typeface="맑은 고딕" charset="0"/>
+              </a:rPr>
+              <a:t> Character 오브젝트</a:t>
+            </a:r>
+            <a:r>
+              <a:rPr lang="ko-KR" sz="1800">
+                <a:latin typeface="맑은 고딕" charset="0"/>
+                <a:ea typeface="맑은 고딕" charset="0"/>
+              </a:rPr>
+              <a:t>를 선택</a:t>
+            </a:r>
+            <a:r>
+              <a:rPr lang="ko-KR" sz="1800">
+                <a:latin typeface="맑은 고딕" charset="0"/>
+                <a:ea typeface="맑은 고딕" charset="0"/>
+              </a:rPr>
+              <a:t>한 다음</a:t>
+            </a:r>
+            <a:r>
+              <a:rPr sz="1800">
+                <a:latin typeface="맑은 고딕" charset="0"/>
+                <a:ea typeface="맑은 고딕" charset="0"/>
+              </a:rPr>
+              <a:t> Photon Voice View 컴포넌트</a:t>
+            </a:r>
+            <a:r>
+              <a:rPr lang="ko-KR" sz="1800">
+                <a:latin typeface="맑은 고딕" charset="0"/>
+                <a:ea typeface="맑은 고딕" charset="0"/>
+              </a:rPr>
+              <a:t>에 있는 </a:t>
+            </a:r>
+            <a:r>
+              <a:rPr sz="1800">
+                <a:latin typeface="맑은 고딕" charset="0"/>
+                <a:ea typeface="맑은 고딕" charset="0"/>
+              </a:rPr>
+              <a:t>Speaker In Use에 </a:t>
+            </a:r>
+            <a:r>
+              <a:rPr lang="ko-KR" sz="1800">
+                <a:latin typeface="맑은 고딕" charset="0"/>
+                <a:ea typeface="맑은 고딕" charset="0"/>
+              </a:rPr>
+              <a:t>Character 오브젝트를 넣어줍니다.</a:t>
             </a:r>
             <a:endParaRPr lang="ko-KR" altLang="en-US" sz="1800">
               <a:latin typeface="맑은 고딕" charset="0"/>
               <a:ea typeface="맑은 고딕" charset="0"/>
             </a:endParaRPr>
           </a:p>
-          <a:p>
-            <a:pPr marL="0" indent="0" rtl="0" algn="l" defTabSz="914400" eaLnBrk="1" latinLnBrk="0" hangingPunct="1">
-              <a:buFontTx/>
-              <a:buNone/>
-            </a:pPr>
-            <a:endParaRPr lang="ko-KR" altLang="en-US" sz="1800">
-              <a:latin typeface="맑은 고딕" charset="0"/>
-              <a:ea typeface="맑은 고딕" charset="0"/>
-            </a:endParaRPr>
-          </a:p>
-          <a:p>
-            <a:pPr marL="0" indent="0" rtl="0" algn="l" defTabSz="914400" eaLnBrk="1" latinLnBrk="0" hangingPunct="1">
-              <a:buFontTx/>
-              <a:buNone/>
-            </a:pPr>
-            <a:r>
-              <a:rPr lang="ko-KR" sz="1800">
-                <a:latin typeface="맑은 고딕" charset="0"/>
-                <a:ea typeface="맑은 고딕" charset="0"/>
-              </a:rPr>
-              <a:t>그리고</a:t>
-            </a:r>
-            <a:r>
-              <a:rPr sz="1800">
-                <a:latin typeface="맑은 고딕" charset="0"/>
-                <a:ea typeface="맑은 고딕" charset="0"/>
-              </a:rPr>
-              <a:t> Photon Voice View 컴포넌트</a:t>
-            </a:r>
-            <a:r>
-              <a:rPr lang="ko-KR" sz="1800">
-                <a:latin typeface="맑은 고딕" charset="0"/>
-                <a:ea typeface="맑은 고딕" charset="0"/>
-              </a:rPr>
-              <a:t>에 있는 </a:t>
-            </a:r>
-            <a:r>
-              <a:rPr sz="1800">
-                <a:latin typeface="맑은 고딕" charset="0"/>
-                <a:ea typeface="맑은 고딕" charset="0"/>
-              </a:rPr>
-              <a:t>Speaker In Use에 </a:t>
-            </a:r>
-            <a:r>
-              <a:rPr lang="ko-KR" sz="1800">
-                <a:latin typeface="맑은 고딕" charset="0"/>
-                <a:ea typeface="맑은 고딕" charset="0"/>
-              </a:rPr>
-              <a:t>Character 오브젝트를 넣어줍니다.</a:t>
-            </a:r>
-            <a:endParaRPr lang="ko-KR" altLang="en-US" sz="1800">
-              <a:latin typeface="맑은 고딕" charset="0"/>
-              <a:ea typeface="맑은 고딕" charset="0"/>
-            </a:endParaRPr>
-          </a:p>
         </p:txBody>
       </p:sp>
       <p:pic>
         <p:nvPicPr>
-          <p:cNvPr id="61" name="그림 105" descr="C:/Users/Admin1/AppData/Roaming/PolarisOffice/ETemp/7276_13419048/fImage89153225436.png"/>
+          <p:cNvPr id="61" name="그림 105"/>
           <p:cNvPicPr>
             <a:picLocks noChangeAspect="1"/>
           </p:cNvPicPr>
@@ -10037,8 +10171,8 @@
         </p:nvSpPr>
         <p:spPr>
           <a:xfrm rot="0">
-            <a:off x="6818630" y="3061970"/>
-            <a:ext cx="4164330" cy="3138805"/>
+            <a:off x="6818630" y="3070225"/>
+            <a:ext cx="4155440" cy="3138805"/>
           </a:xfrm>
           <a:prstGeom prst="rect"/>
           <a:noFill/>
@@ -10065,17 +10199,7 @@
                 <a:latin typeface="맑은 고딕" charset="0"/>
                 <a:ea typeface="맑은 고딕" charset="0"/>
               </a:rPr>
-              <a:t>31</a:t>
-            </a:r>
-            <a:r>
-              <a:rPr sz="1800" b="1">
-                <a:solidFill>
-                  <a:srgbClr val="0611F2"/>
-                </a:solidFill>
-                <a:latin typeface="맑은 고딕" charset="0"/>
-                <a:ea typeface="맑은 고딕" charset="0"/>
-              </a:rPr>
-              <a:t>.</a:t>
+              <a:t>31.</a:t>
             </a:r>
             <a:r>
               <a:rPr sz="1800">
@@ -10089,42 +10213,21 @@
                 <a:latin typeface="맑은 고딕" charset="0"/>
                 <a:ea typeface="맑은 고딕" charset="0"/>
               </a:rPr>
-              <a:t>이</a:t>
+              <a:t>그리</a:t>
             </a:r>
             <a:r>
               <a:rPr lang="ko-KR" sz="1800">
                 <a:latin typeface="맑은 고딕" charset="0"/>
                 <a:ea typeface="맑은 고딕" charset="0"/>
               </a:rPr>
-              <a:t>제</a:t>
+              <a:t>고</a:t>
             </a:r>
             <a:r>
               <a:rPr lang="ko-KR" sz="1800">
                 <a:latin typeface="맑은 고딕" charset="0"/>
                 <a:ea typeface="맑은 고딕" charset="0"/>
               </a:rPr>
-              <a:t> Character</a:t>
-            </a:r>
-            <a:r>
-              <a:rPr lang="ko-KR" sz="1800">
-                <a:latin typeface="맑은 고딕" charset="0"/>
-                <a:ea typeface="맑은 고딕" charset="0"/>
-              </a:rPr>
-              <a:t> 오브젝트</a:t>
-            </a:r>
-            <a:r>
-              <a:rPr lang="ko-KR" sz="1800">
-                <a:latin typeface="맑은 고딕" charset="0"/>
-                <a:ea typeface="맑은 고딕" charset="0"/>
-              </a:rPr>
-              <a:t>를 선택</a:t>
-            </a:r>
-            <a:r>
-              <a:rPr lang="ko-KR" sz="1800">
-                <a:latin typeface="맑은 고딕" charset="0"/>
-                <a:ea typeface="맑은 고딕" charset="0"/>
-              </a:rPr>
-              <a:t>합니다.</a:t>
+              <a:t> Character 오브젝트를 선택합니다.</a:t>
             </a:r>
             <a:endParaRPr lang="ko-KR" altLang="en-US" sz="1800">
               <a:latin typeface="맑은 고딕" charset="0"/>
@@ -10151,21 +10254,7 @@
                 <a:latin typeface="맑은 고딕" charset="0"/>
                 <a:ea typeface="맑은 고딕" charset="0"/>
               </a:rPr>
-              <a:t>그런 다음</a:t>
-            </a:r>
-            <a:r>
-              <a:rPr lang="ko-KR" sz="1800">
-                <a:latin typeface="맑은 고딕" charset="0"/>
-                <a:ea typeface="맑은 고딕" charset="0"/>
-              </a:rPr>
-              <a:t> Prefab 씬에서 PhotonControl 스크립트에 있는 Speed와 Angle Speed</a:t>
-            </a:r>
-            <a:r>
-              <a:rPr lang="ko-KR" sz="1800">
-                <a:latin typeface="맑은 고딕" charset="0"/>
-                <a:ea typeface="맑은 고딕" charset="0"/>
-              </a:rPr>
-              <a:t>의 값을 설정합니다.</a:t>
+              <a:t>그런 다음 Prefab 씬에서 PhotonControl 스크립트에 있는 Speed와 Angle Speed의 값을 설정합니다.</a:t>
             </a:r>
             <a:endParaRPr lang="ko-KR" altLang="en-US" sz="1800">
               <a:latin typeface="맑은 고딕" charset="0"/>
@@ -10192,35 +10281,7 @@
                 <a:latin typeface="맑은 고딕" charset="0"/>
                 <a:ea typeface="맑은 고딕" charset="0"/>
               </a:rPr>
-              <a:t>그다음</a:t>
-            </a:r>
-            <a:r>
-              <a:rPr lang="ko-KR" sz="1800">
-                <a:latin typeface="맑은 고딕" charset="0"/>
-                <a:ea typeface="맑은 고딕" charset="0"/>
-              </a:rPr>
-              <a:t>으로</a:t>
-            </a:r>
-            <a:r>
-              <a:rPr lang="ko-KR" sz="1800">
-                <a:latin typeface="맑은 고딕" charset="0"/>
-                <a:ea typeface="맑은 고딕" charset="0"/>
-              </a:rPr>
-              <a:t> Character 오브젝트 하위에 있는 </a:t>
-            </a:r>
-            <a:r>
-              <a:rPr lang="ko-KR" sz="1800">
-                <a:latin typeface="맑은 고딕" charset="0"/>
-                <a:ea typeface="맑은 고딕" charset="0"/>
-              </a:rPr>
-              <a:t>Main </a:t>
-            </a:r>
-            <a:r>
-              <a:rPr lang="ko-KR" sz="1800">
-                <a:latin typeface="맑은 고딕" charset="0"/>
-                <a:ea typeface="맑은 고딕" charset="0"/>
-              </a:rPr>
-              <a:t>Camera 오브젝트를 넣어줍니다.</a:t>
+              <a:t>그다음으로 Character 오브젝트 하위에 있는 Main Camera 오브젝트를 넣어줍니다.</a:t>
             </a:r>
             <a:endParaRPr lang="ko-KR" altLang="en-US" sz="1800">
               <a:latin typeface="맑은 고딕" charset="0"/>
@@ -10231,7 +10292,7 @@
       </p:sp>
       <p:pic>
         <p:nvPicPr>
-          <p:cNvPr id="65" name="그림 44" descr="C:/Users/Admin1/AppData/Roaming/PolarisOffice/ETemp/7276_13419048/fImage68982326962.png"/>
+          <p:cNvPr id="65" name="그림 44" descr="C:/Users/Admin1/AppData/Roaming/PolarisOffice/ETemp/15444_16111816/fImage68982326962.png"/>
           <p:cNvPicPr>
             <a:picLocks noChangeAspect="1"/>
           </p:cNvPicPr>
@@ -10251,8 +10312,8 @@
         </p:blipFill>
         <p:spPr>
           <a:xfrm rot="0">
-            <a:off x="1220470" y="1397635"/>
-            <a:ext cx="4247515" cy="1441450"/>
+            <a:off x="1222375" y="1338580"/>
+            <a:ext cx="4156710" cy="1130935"/>
           </a:xfrm>
           <a:prstGeom prst="roundRect"/>
           <a:solidFill>
@@ -10268,8 +10329,8 @@
         </p:nvCxnSpPr>
         <p:spPr>
           <a:xfrm rot="0">
-            <a:off x="2495550" y="2771775"/>
-            <a:ext cx="2809240" cy="920750"/>
+            <a:off x="2510790" y="2419350"/>
+            <a:ext cx="2710815" cy="1471930"/>
           </a:xfrm>
           <a:prstGeom prst="straightConnector1"/>
           <a:ln w="6350" cap="flat" cmpd="sng">
@@ -10294,7 +10355,7 @@
       </p:cxnSp>
       <p:pic>
         <p:nvPicPr>
-          <p:cNvPr id="66" name="그림 45" descr="C:/Users/Admin1/AppData/Roaming/PolarisOffice/ETemp/7276_13419048/fImage81063165705.png"/>
+          <p:cNvPr id="66" name="그림 45"/>
           <p:cNvPicPr>
             <a:picLocks noChangeAspect="1"/>
           </p:cNvPicPr>
@@ -10462,9 +10523,9 @@
           <p:nvPr/>
         </p:nvSpPr>
         <p:spPr>
-          <a:xfrm>
-            <a:off x="1366520" y="4557395"/>
-            <a:ext cx="4014470" cy="1477645"/>
+          <a:xfrm rot="0">
+            <a:off x="1222375" y="4557395"/>
+            <a:ext cx="4182110" cy="1477645"/>
           </a:xfrm>
           <a:prstGeom prst="rect"/>
           <a:noFill/>
@@ -10491,17 +10552,7 @@
                 <a:latin typeface="맑은 고딕" charset="0"/>
                 <a:ea typeface="맑은 고딕" charset="0"/>
               </a:rPr>
-              <a:t>32</a:t>
-            </a:r>
-            <a:r>
-              <a:rPr sz="1800" b="1">
-                <a:solidFill>
-                  <a:srgbClr val="0611F2"/>
-                </a:solidFill>
-                <a:latin typeface="맑은 고딕" charset="0"/>
-                <a:ea typeface="맑은 고딕" charset="0"/>
-              </a:rPr>
-              <a:t>.</a:t>
+              <a:t>32.</a:t>
             </a:r>
             <a:r>
               <a:rPr sz="1800">
@@ -10560,9 +10611,9 @@
           <p:nvPr/>
         </p:nvSpPr>
         <p:spPr>
-          <a:xfrm>
+          <a:xfrm rot="0">
             <a:off x="6827520" y="2713990"/>
-            <a:ext cx="4245610" cy="923925"/>
+            <a:ext cx="4146550" cy="923925"/>
           </a:xfrm>
           <a:prstGeom prst="rect"/>
           <a:noFill/>
@@ -10589,17 +10640,7 @@
                 <a:latin typeface="맑은 고딕" charset="0"/>
                 <a:ea typeface="맑은 고딕" charset="0"/>
               </a:rPr>
-              <a:t>33</a:t>
-            </a:r>
-            <a:r>
-              <a:rPr sz="1800" b="1">
-                <a:solidFill>
-                  <a:srgbClr val="0611F2"/>
-                </a:solidFill>
-                <a:latin typeface="맑은 고딕" charset="0"/>
-                <a:ea typeface="맑은 고딕" charset="0"/>
-              </a:rPr>
-              <a:t>.</a:t>
+              <a:t>33.</a:t>
             </a:r>
             <a:r>
               <a:rPr sz="1800">
@@ -10624,7 +10665,7 @@
       </p:sp>
       <p:pic>
         <p:nvPicPr>
-          <p:cNvPr id="64" name="그림 4" descr="C:/Users/Admin1/AppData/Roaming/PolarisOffice/ETemp/7276_13419048/fImage217262668467.png"/>
+          <p:cNvPr id="64" name="그림 4" descr="C:/Users/Admin1/AppData/Roaming/PolarisOffice/ETemp/15444_16111816/fImage217262668467.png"/>
           <p:cNvPicPr>
             <a:picLocks noChangeAspect="1"/>
           </p:cNvPicPr>
@@ -10644,8 +10685,8 @@
         </p:blipFill>
         <p:spPr>
           <a:xfrm rot="0">
-            <a:off x="1365885" y="1390650"/>
-            <a:ext cx="2511425" cy="3030220"/>
+            <a:off x="1230630" y="1390650"/>
+            <a:ext cx="2647315" cy="3030855"/>
           </a:xfrm>
           <a:prstGeom prst="roundRect"/>
           <a:solidFill>
@@ -10655,7 +10696,7 @@
       </p:pic>
       <p:pic>
         <p:nvPicPr>
-          <p:cNvPr id="65" name="그림 11" descr="C:/Users/Admin1/AppData/Roaming/PolarisOffice/ETemp/7276_13419048/fImage21742696334.png"/>
+          <p:cNvPr id="65" name="그림 11"/>
           <p:cNvPicPr>
             <a:picLocks noChangeAspect="1"/>
           </p:cNvPicPr>
@@ -10686,7 +10727,7 @@
       </p:pic>
       <p:pic>
         <p:nvPicPr>
-          <p:cNvPr id="68" name="그림 18" descr="C:/Users/Admin1/AppData/Roaming/PolarisOffice/ETemp/7276_13419048/fImage168562729169.png"/>
+          <p:cNvPr id="68" name="그림 18" descr="C:/Users/Admin1/AppData/Roaming/PolarisOffice/ETemp/15444_16111816/fImage168562729169.png"/>
           <p:cNvPicPr>
             <a:picLocks noChangeAspect="1"/>
           </p:cNvPicPr>
@@ -10707,7 +10748,7 @@
         <p:spPr>
           <a:xfrm rot="0">
             <a:off x="6817995" y="1390650"/>
-            <a:ext cx="4253865" cy="1222375"/>
+            <a:ext cx="4147820" cy="1223010"/>
           </a:xfrm>
           <a:prstGeom prst="roundRect"/>
           <a:solidFill>
@@ -10717,17 +10758,17 @@
       </p:pic>
       <p:pic>
         <p:nvPicPr>
-          <p:cNvPr id="69" name="그림 21"/>
+          <p:cNvPr id="69" name="그림 21" descr="C:/Users/Admin1/AppData/Roaming/PolarisOffice/ETemp/15444_16111816/fImage119622735724.png"/>
           <p:cNvPicPr>
             <a:picLocks noChangeAspect="1"/>
           </p:cNvPicPr>
           <p:nvPr/>
         </p:nvPicPr>
         <p:blipFill rotWithShape="1">
-          <a:blip r:embed="rId6" cstate="print">
+          <a:blip r:embed="rId6" cstate="hqprint">
             <a:extLst>
               <a:ext uri="{28A0092B-C50C-407E-A947-70E740481C1C}">
-                <a14:useLocalDpi xmlns:a14="http://schemas.microsoft.com/office/drawing/2010/main" val="0"/>
+                <a14:useLocalDpi xmlns:a14="http://schemas.microsoft.com/office/drawing/2010/main"/>
               </a:ext>
             </a:extLst>
           </a:blip>
@@ -10738,7 +10779,7 @@
         <p:spPr>
           <a:xfrm rot="0">
             <a:off x="6822440" y="3790315"/>
-            <a:ext cx="4239895" cy="1425575"/>
+            <a:ext cx="4143375" cy="1426210"/>
           </a:xfrm>
           <a:prstGeom prst="roundRect"/>
           <a:solidFill>
@@ -10757,7 +10798,7 @@
         <p:spPr>
           <a:xfrm rot="0">
             <a:off x="6825615" y="5390515"/>
-            <a:ext cx="4245610" cy="647065"/>
+            <a:ext cx="4148455" cy="647065"/>
           </a:xfrm>
           <a:prstGeom prst="rect"/>
           <a:noFill/>
@@ -10784,17 +10825,7 @@
                 <a:latin typeface="맑은 고딕" charset="0"/>
                 <a:ea typeface="맑은 고딕" charset="0"/>
               </a:rPr>
-              <a:t>34</a:t>
-            </a:r>
-            <a:r>
-              <a:rPr sz="1800" b="1">
-                <a:solidFill>
-                  <a:srgbClr val="0611F2"/>
-                </a:solidFill>
-                <a:latin typeface="맑은 고딕" charset="0"/>
-                <a:ea typeface="맑은 고딕" charset="0"/>
-              </a:rPr>
-              <a:t>.</a:t>
+              <a:t>34.</a:t>
             </a:r>
             <a:r>
               <a:rPr sz="1800">
@@ -10819,7 +10850,7 @@
       </p:sp>
       <p:pic>
         <p:nvPicPr>
-          <p:cNvPr id="71" name="그림 52" descr="C:/Users/Admin1/AppData/Roaming/PolarisOffice/ETemp/7276_13419048/fImage95963178145.png"/>
+          <p:cNvPr id="71" name="그림 52"/>
           <p:cNvPicPr>
             <a:picLocks noChangeAspect="1"/>
           </p:cNvPicPr>
@@ -10850,7 +10881,7 @@
       </p:pic>
       <p:pic>
         <p:nvPicPr>
-          <p:cNvPr id="72" name="그림 55" descr="C:/Users/Admin1/AppData/Roaming/PolarisOffice/ETemp/7276_13419048/fImage2242172279169.png"/>
+          <p:cNvPr id="72" name="그림 55"/>
           <p:cNvPicPr>
             <a:picLocks noChangeAspect="1"/>
           </p:cNvPicPr>
@@ -11106,7 +11137,7 @@
       </p:sp>
       <p:pic>
         <p:nvPicPr>
-          <p:cNvPr id="72" name="그림 28" descr="C:/Users/Admin1/AppData/Roaming/PolarisOffice/ETemp/7276_13419048/fImage191682899358.png"/>
+          <p:cNvPr id="72" name="그림 28"/>
           <p:cNvPicPr>
             <a:picLocks noChangeAspect="1"/>
           </p:cNvPicPr>
@@ -11272,7 +11303,7 @@
       </p:sp>
       <p:pic>
         <p:nvPicPr>
-          <p:cNvPr id="74" name="그림 4" descr="C:/Users/Admin1/AppData/Roaming/PolarisOffice/ETemp/7276_13419048/fImage133412986962.png"/>
+          <p:cNvPr id="74" name="그림 4"/>
           <p:cNvPicPr>
             <a:picLocks noChangeAspect="1"/>
           </p:cNvPicPr>
@@ -11409,8 +11440,8 @@
         </p:nvSpPr>
         <p:spPr>
           <a:xfrm rot="0">
-            <a:off x="1384300" y="2974975"/>
-            <a:ext cx="4004945" cy="647065"/>
+            <a:off x="1238885" y="3082925"/>
+            <a:ext cx="4150995" cy="647065"/>
           </a:xfrm>
           <a:prstGeom prst="rect"/>
           <a:noFill/>
@@ -11437,27 +11468,7 @@
                 <a:latin typeface="맑은 고딕" charset="0"/>
                 <a:ea typeface="맑은 고딕" charset="0"/>
               </a:rPr>
-              <a:t>3</a:t>
-            </a:r>
-            <a:r>
-              <a:rPr sz="1800" b="1">
-                <a:solidFill>
-                  <a:srgbClr val="0611F2"/>
-                </a:solidFill>
-                <a:latin typeface="맑은 고딕" charset="0"/>
-                <a:ea typeface="맑은 고딕" charset="0"/>
-              </a:rPr>
-              <a:t>7</a:t>
-            </a:r>
-            <a:r>
-              <a:rPr sz="1800" b="1">
-                <a:solidFill>
-                  <a:srgbClr val="0611F2"/>
-                </a:solidFill>
-                <a:latin typeface="맑은 고딕" charset="0"/>
-                <a:ea typeface="맑은 고딕" charset="0"/>
-              </a:rPr>
-              <a:t>.</a:t>
+              <a:t>37.</a:t>
             </a:r>
             <a:r>
               <a:rPr sz="1800">
@@ -11482,7 +11493,7 @@
       </p:sp>
       <p:pic>
         <p:nvPicPr>
-          <p:cNvPr id="76" name="그림 14" descr="C:/Users/Admin1/AppData/Roaming/PolarisOffice/ETemp/7276_13419048/fImage747921941.png"/>
+          <p:cNvPr id="76" name="그림 14"/>
           <p:cNvPicPr>
             <a:picLocks noChangeAspect="1"/>
           </p:cNvPicPr>
@@ -11513,17 +11524,17 @@
       </p:pic>
       <p:pic>
         <p:nvPicPr>
-          <p:cNvPr id="77" name="그림 17"/>
+          <p:cNvPr id="77" name="그림 17" descr="C:/Users/Admin1/AppData/Roaming/PolarisOffice/ETemp/15444_16111816/fImage51412208467.png"/>
           <p:cNvPicPr>
             <a:picLocks noChangeAspect="1"/>
           </p:cNvPicPr>
           <p:nvPr/>
         </p:nvPicPr>
         <p:blipFill rotWithShape="1">
-          <a:blip r:embed="rId6" cstate="print">
+          <a:blip r:embed="rId6" cstate="hqprint">
             <a:extLst>
               <a:ext uri="{28A0092B-C50C-407E-A947-70E740481C1C}">
-                <a14:useLocalDpi xmlns:a14="http://schemas.microsoft.com/office/drawing/2010/main" val="0"/>
+                <a14:useLocalDpi xmlns:a14="http://schemas.microsoft.com/office/drawing/2010/main"/>
               </a:ext>
             </a:extLst>
           </a:blip>
@@ -11534,7 +11545,7 @@
         <p:spPr>
           <a:xfrm rot="0">
             <a:off x="6811010" y="2758440"/>
-            <a:ext cx="4182110" cy="1454150"/>
+            <a:ext cx="4182745" cy="1506855"/>
           </a:xfrm>
           <a:prstGeom prst="roundRect"/>
           <a:solidFill>
@@ -11550,8 +11561,8 @@
         </p:nvCxnSpPr>
         <p:spPr>
           <a:xfrm rot="0" flipV="1">
-            <a:off x="8173085" y="2291715"/>
-            <a:ext cx="2726055" cy="1610360"/>
+            <a:off x="8163560" y="2291715"/>
+            <a:ext cx="2736215" cy="1657350"/>
           </a:xfrm>
           <a:prstGeom prst="straightConnector1"/>
           <a:ln w="6350" cap="flat" cmpd="sng">
@@ -11583,9 +11594,9 @@
           <p:nvPr/>
         </p:nvSpPr>
         <p:spPr>
-          <a:xfrm>
-            <a:off x="6818630" y="4335780"/>
-            <a:ext cx="4166870" cy="1754505"/>
+          <a:xfrm rot="0">
+            <a:off x="6818630" y="4368800"/>
+            <a:ext cx="4167505" cy="1755140"/>
           </a:xfrm>
           <a:prstGeom prst="rect"/>
           <a:noFill/>
@@ -11684,7 +11695,7 @@
       </p:sp>
       <p:pic>
         <p:nvPicPr>
-          <p:cNvPr id="80" name="그림 23"/>
+          <p:cNvPr id="80" name="그림 23" descr="C:/Users/Admin1/AppData/Roaming/PolarisOffice/ETemp/15444_16111816/fImage47032256334.png"/>
           <p:cNvPicPr>
             <a:picLocks noChangeAspect="1"/>
           </p:cNvPicPr>
@@ -11704,8 +11715,8 @@
         </p:blipFill>
         <p:spPr>
           <a:xfrm rot="0">
-            <a:off x="1377315" y="3789045"/>
-            <a:ext cx="4014470" cy="1350645"/>
+            <a:off x="1238885" y="3855085"/>
+            <a:ext cx="4153535" cy="1449070"/>
           </a:xfrm>
           <a:prstGeom prst="roundRect"/>
           <a:solidFill>
@@ -11722,9 +11733,9 @@
           <p:nvPr/>
         </p:nvSpPr>
         <p:spPr>
-          <a:xfrm>
-            <a:off x="1378585" y="5271135"/>
-            <a:ext cx="3996690" cy="677545"/>
+          <a:xfrm rot="0">
+            <a:off x="1238885" y="5453380"/>
+            <a:ext cx="4145280" cy="677545"/>
           </a:xfrm>
           <a:prstGeom prst="rect"/>
           <a:noFill/>
@@ -11751,17 +11762,7 @@
                 <a:latin typeface="맑은 고딕" charset="0"/>
                 <a:ea typeface="맑은 고딕" charset="0"/>
               </a:rPr>
-              <a:t>3</a:t>
-            </a:r>
-            <a:r>
-              <a:rPr lang="ko-KR" sz="2000" b="1">
-                <a:solidFill>
-                  <a:srgbClr val="0611F2"/>
-                </a:solidFill>
-                <a:latin typeface="맑은 고딕" charset="0"/>
-                <a:ea typeface="맑은 고딕" charset="0"/>
-              </a:rPr>
-              <a:t>8</a:t>
+              <a:t>38</a:t>
             </a:r>
             <a:r>
               <a:rPr sz="2000" b="1">
@@ -11803,14 +11804,333 @@
       </p:sp>
       <p:pic>
         <p:nvPicPr>
-          <p:cNvPr id="82" name="그림 56" descr="C:/Users/Admin1/AppData/Roaming/PolarisOffice/ETemp/7276_13419048/fImage129503193281.png"/>
+          <p:cNvPr id="82" name="그림 56" descr="C:/Users/Admin1/AppData/Roaming/PolarisOffice/ETemp/15444_16111816/fImage129503193281.png"/>
           <p:cNvPicPr>
             <a:picLocks noChangeAspect="1"/>
           </p:cNvPicPr>
           <p:nvPr/>
         </p:nvPicPr>
         <p:blipFill rotWithShape="1">
-          <a:blip r:embed="rId8" cstate="print">
+          <a:blip r:embed="rId8" cstate="hqprint">
+            <a:extLst>
+              <a:ext uri="{28A0092B-C50C-407E-A947-70E740481C1C}">
+                <a14:useLocalDpi xmlns:a14="http://schemas.microsoft.com/office/drawing/2010/main"/>
+              </a:ext>
+            </a:extLst>
+          </a:blip>
+          <a:stretch>
+            <a:fillRect/>
+          </a:stretch>
+        </p:blipFill>
+        <p:spPr>
+          <a:xfrm rot="0">
+            <a:off x="1238885" y="1419225"/>
+            <a:ext cx="4144010" cy="1565910"/>
+          </a:xfrm>
+          <a:prstGeom prst="roundRect"/>
+          <a:solidFill>
+            <a:srgbClr val="EDEDED"/>
+          </a:solidFill>
+        </p:spPr>
+      </p:pic>
+    </p:spTree>
+  </p:cSld>
+  <p:clrMapOvr>
+    <a:masterClrMapping/>
+  </p:clrMapOvr>
+  <mc:AlternateContent xmlns:mc="http://schemas.openxmlformats.org/markup-compatibility/2006">
+    <mc:Choice xmlns:p14="http://schemas.microsoft.com/office/powerpoint/2010/main" Requires="p14">
+      <p:transition spd="slow" p14:dur="2000"/>
+    </mc:Choice>
+    <mc:Fallback>
+      <p:transition spd="slow"/>
+    </mc:Fallback>
+  </mc:AlternateContent>
+  <p:timing>
+    <p:tnLst>
+      <p:par>
+        <p:cTn id="1" dur="indefinite" restart="never" nodeType="tmRoot"/>
+      </p:par>
+    </p:tnLst>
+  </p:timing>
+</p:sld>
+</file>
+
+<file path=ppt/slides/slide17.xml><?xml version="1.0" encoding="utf-8"?>
+<p:sld xmlns:a="http://schemas.openxmlformats.org/drawingml/2006/main" xmlns:r="http://schemas.openxmlformats.org/officeDocument/2006/relationships" xmlns:p="http://schemas.openxmlformats.org/presentationml/2006/main">
+  <p:cSld>
+    <p:spTree>
+      <p:nvGrpSpPr>
+        <p:cNvPr id="1" name=""/>
+        <p:cNvGrpSpPr/>
+        <p:nvPr/>
+      </p:nvGrpSpPr>
+      <p:grpSpPr>
+        <a:xfrm>
+          <a:off x="0" y="0"/>
+          <a:ext cx="0" cy="0"/>
+          <a:chOff x="0" y="0"/>
+          <a:chExt cx="0" cy="0"/>
+        </a:xfrm>
+      </p:grpSpPr>
+      <p:sp>
+        <p:nvSpPr>
+          <p:cNvPr id="27" name="Rect 0"/>
+          <p:cNvSpPr txBox="1">
+            <a:spLocks/>
+          </p:cNvSpPr>
+          <p:nvPr/>
+        </p:nvSpPr>
+        <p:spPr>
+          <a:xfrm rot="0">
+            <a:off x="4101465" y="407035"/>
+            <a:ext cx="3986530" cy="554990"/>
+          </a:xfrm>
+          <a:prstGeom prst="rect"/>
+          <a:noFill/>
+          <a:ln w="0">
+            <a:noFill/>
+            <a:prstDash/>
+          </a:ln>
+        </p:spPr>
+        <p:txBody>
+          <a:bodyPr wrap="square" lIns="89535" tIns="46355" rIns="89535" bIns="46355" numCol="1" vert="horz" anchor="t">
+            <a:spAutoFit/>
+          </a:bodyPr>
+          <a:lstStyle/>
+          <a:p>
+            <a:pPr marL="0" indent="0" algn="l" latinLnBrk="0" hangingPunct="1">
+              <a:buFontTx/>
+              <a:buNone/>
+            </a:pPr>
+            <a:r>
+              <a:rPr lang="ko-KR" sz="3000" b="1">
+                <a:latin typeface="맑은 고딕" charset="0"/>
+                <a:ea typeface="맑은 고딕" charset="0"/>
+              </a:rPr>
+              <a:t>열</a:t>
+            </a:r>
+            <a:r>
+              <a:rPr lang="ko-KR" sz="3000" b="1">
+                <a:latin typeface="맑은 고딕" charset="0"/>
+                <a:ea typeface="맑은 고딕" charset="0"/>
+              </a:rPr>
+              <a:t>일곱</a:t>
+            </a:r>
+            <a:r>
+              <a:rPr lang="ko-KR" sz="3000" b="1">
+                <a:latin typeface="맑은 고딕" charset="0"/>
+                <a:ea typeface="맑은 고딕" charset="0"/>
+              </a:rPr>
+              <a:t> 번째 튜토리얼</a:t>
+            </a:r>
+            <a:endParaRPr lang="ko-KR" altLang="en-US" sz="3000" b="1">
+              <a:latin typeface="맑은 고딕" charset="0"/>
+              <a:ea typeface="맑은 고딕" charset="0"/>
+            </a:endParaRPr>
+          </a:p>
+        </p:txBody>
+      </p:sp>
+      <p:sp>
+        <p:nvSpPr>
+          <p:cNvPr id="79" name="Rect 0"/>
+          <p:cNvSpPr txBox="1">
+            <a:spLocks/>
+          </p:cNvSpPr>
+          <p:nvPr/>
+        </p:nvSpPr>
+        <p:spPr>
+          <a:xfrm rot="0">
+            <a:off x="6818630" y="2856230"/>
+            <a:ext cx="4163695" cy="923925"/>
+          </a:xfrm>
+          <a:prstGeom prst="rect"/>
+          <a:noFill/>
+          <a:ln w="0">
+            <a:noFill/>
+            <a:prstDash/>
+          </a:ln>
+        </p:spPr>
+        <p:txBody>
+          <a:bodyPr wrap="square" lIns="89535" tIns="46355" rIns="89535" bIns="46355" numCol="1" vert="horz" anchor="t">
+            <a:spAutoFit/>
+          </a:bodyPr>
+          <a:lstStyle/>
+          <a:p>
+            <a:pPr marL="0" indent="0" rtl="0" algn="l" defTabSz="914400" eaLnBrk="1" latinLnBrk="0" hangingPunct="1">
+              <a:buFontTx/>
+              <a:buNone/>
+            </a:pPr>
+            <a:r>
+              <a:rPr sz="1800" b="1">
+                <a:solidFill>
+                  <a:srgbClr val="0611F2"/>
+                </a:solidFill>
+                <a:latin typeface="맑은 고딕" charset="0"/>
+                <a:ea typeface="맑은 고딕" charset="0"/>
+              </a:rPr>
+              <a:t>41</a:t>
+            </a:r>
+            <a:r>
+              <a:rPr sz="1800" b="1">
+                <a:solidFill>
+                  <a:srgbClr val="0611F2"/>
+                </a:solidFill>
+                <a:latin typeface="맑은 고딕" charset="0"/>
+                <a:ea typeface="맑은 고딕" charset="0"/>
+              </a:rPr>
+              <a:t>.</a:t>
+            </a:r>
+            <a:r>
+              <a:rPr sz="1800">
+                <a:latin typeface="맑은 고딕" charset="0"/>
+                <a:ea typeface="맑은 고딕" charset="0"/>
+              </a:rPr>
+              <a:t> </a:t>
+            </a:r>
+            <a:r>
+              <a:rPr lang="ko-KR" sz="1800">
+                <a:latin typeface="맑은 고딕" charset="0"/>
+                <a:ea typeface="맑은 고딕" charset="0"/>
+              </a:rPr>
+              <a:t>그</a:t>
+            </a:r>
+            <a:r>
+              <a:rPr lang="ko-KR" sz="1800">
+                <a:latin typeface="맑은 고딕" charset="0"/>
+                <a:ea typeface="맑은 고딕" charset="0"/>
+              </a:rPr>
+              <a:t>리고</a:t>
+            </a:r>
+            <a:r>
+              <a:rPr lang="ko-KR" sz="1800">
+                <a:latin typeface="맑은 고딕" charset="0"/>
+                <a:ea typeface="맑은 고딕" charset="0"/>
+              </a:rPr>
+              <a:t> Character 오브젝트에</a:t>
+            </a:r>
+            <a:r>
+              <a:rPr lang="ko-KR" sz="1800">
+                <a:latin typeface="맑은 고딕" charset="0"/>
+                <a:ea typeface="맑은 고딕" charset="0"/>
+              </a:rPr>
+              <a:t> Animator 폴더에 있는 Photon Animator를 넣어줍니다.</a:t>
+            </a:r>
+            <a:endParaRPr lang="ko-KR" altLang="en-US" sz="1800">
+              <a:latin typeface="맑은 고딕" charset="0"/>
+              <a:ea typeface="맑은 고딕" charset="0"/>
+            </a:endParaRPr>
+          </a:p>
+        </p:txBody>
+      </p:sp>
+      <p:sp>
+        <p:nvSpPr>
+          <p:cNvPr id="81" name="Rect 0"/>
+          <p:cNvSpPr txBox="1">
+            <a:spLocks/>
+          </p:cNvSpPr>
+          <p:nvPr/>
+        </p:nvSpPr>
+        <p:spPr>
+          <a:xfrm rot="0">
+            <a:off x="1255395" y="3866515"/>
+            <a:ext cx="4123690" cy="2338705"/>
+          </a:xfrm>
+          <a:prstGeom prst="rect"/>
+          <a:noFill/>
+          <a:ln w="0">
+            <a:noFill/>
+            <a:prstDash/>
+          </a:ln>
+        </p:spPr>
+        <p:txBody>
+          <a:bodyPr wrap="square" lIns="89535" tIns="46355" rIns="89535" bIns="46355" numCol="1" vert="horz" anchor="t">
+            <a:spAutoFit/>
+          </a:bodyPr>
+          <a:lstStyle/>
+          <a:p>
+            <a:pPr marL="0" indent="0" rtl="0" algn="l" defTabSz="914400" eaLnBrk="1" latinLnBrk="0" hangingPunct="1">
+              <a:buFontTx/>
+              <a:buNone/>
+            </a:pPr>
+            <a:r>
+              <a:rPr lang="ko-KR" sz="2000" b="1">
+                <a:solidFill>
+                  <a:srgbClr val="0611F2"/>
+                </a:solidFill>
+                <a:latin typeface="맑은 고딕" charset="0"/>
+                <a:ea typeface="맑은 고딕" charset="0"/>
+              </a:rPr>
+              <a:t>40</a:t>
+            </a:r>
+            <a:r>
+              <a:rPr sz="2000" b="1">
+                <a:solidFill>
+                  <a:srgbClr val="0611F2"/>
+                </a:solidFill>
+                <a:latin typeface="맑은 고딕" charset="0"/>
+                <a:ea typeface="맑은 고딕" charset="0"/>
+              </a:rPr>
+              <a:t>. </a:t>
+            </a:r>
+            <a:r>
+              <a:rPr sz="1800">
+                <a:latin typeface="맑은 고딕" charset="0"/>
+                <a:ea typeface="맑은 고딕" charset="0"/>
+              </a:rPr>
+              <a:t>이</a:t>
+            </a:r>
+            <a:r>
+              <a:rPr lang="ko-KR" sz="1800">
+                <a:latin typeface="맑은 고딕" charset="0"/>
+                <a:ea typeface="맑은 고딕" charset="0"/>
+              </a:rPr>
+              <a:t>제 GameManager 스크립트에서 ExitGame( ) 함수를 선언하고 PhotonNetwork.LeaveRoom() 함수를 정의합니다.</a:t>
+            </a:r>
+            <a:endParaRPr lang="ko-KR" altLang="en-US" sz="1800">
+              <a:latin typeface="맑은 고딕" charset="0"/>
+              <a:ea typeface="맑은 고딕" charset="0"/>
+            </a:endParaRPr>
+          </a:p>
+          <a:p>
+            <a:pPr marL="0" indent="0" rtl="0" algn="l" defTabSz="914400" eaLnBrk="1" latinLnBrk="0" hangingPunct="1">
+              <a:buFontTx/>
+              <a:buNone/>
+            </a:pPr>
+            <a:endParaRPr lang="ko-KR" altLang="en-US" sz="1800">
+              <a:latin typeface="맑은 고딕" charset="0"/>
+              <a:ea typeface="맑은 고딕" charset="0"/>
+            </a:endParaRPr>
+          </a:p>
+          <a:p>
+            <a:pPr marL="0" indent="0" rtl="0" algn="l" defTabSz="914400" eaLnBrk="1" latinLnBrk="0" hangingPunct="1">
+              <a:buFontTx/>
+              <a:buNone/>
+            </a:pPr>
+            <a:r>
+              <a:rPr lang="ko-KR" sz="1800">
+                <a:latin typeface="맑은 고딕" charset="0"/>
+                <a:ea typeface="맑은 고딕" charset="0"/>
+              </a:rPr>
+              <a:t>그런 다음 현재 룸에서 빠져나왔을 때 Photon Room이라는 씬으로 다시 이동하도록 설정합니다.</a:t>
+            </a:r>
+            <a:endParaRPr lang="ko-KR" altLang="en-US" sz="1800">
+              <a:latin typeface="맑은 고딕" charset="0"/>
+              <a:ea typeface="맑은 고딕" charset="0"/>
+            </a:endParaRPr>
+          </a:p>
+        </p:txBody>
+      </p:sp>
+      <p:pic>
+        <p:nvPicPr>
+          <p:cNvPr id="82" name="그림 5" descr="C:/Users/Admin1/AppData/Roaming/PolarisOffice/ETemp/15444_16111816/fImage449931541.png"/>
+          <p:cNvPicPr>
+            <a:picLocks noChangeAspect="1"/>
+          </p:cNvPicPr>
+          <p:nvPr/>
+        </p:nvPicPr>
+        <p:blipFill rotWithShape="1">
+          <a:blip r:embed="rId2" cstate="print">
             <a:extLst>
               <a:ext uri="{28A0092B-C50C-407E-A947-70E740481C1C}">
                 <a14:useLocalDpi xmlns:a14="http://schemas.microsoft.com/office/drawing/2010/main" val="0"/>
@@ -11823,8 +12143,8 @@
         </p:blipFill>
         <p:spPr>
           <a:xfrm rot="0">
-            <a:off x="1371600" y="1419225"/>
-            <a:ext cx="4010660" cy="1448435"/>
+            <a:off x="1247140" y="1430020"/>
+            <a:ext cx="4131945" cy="2311400"/>
           </a:xfrm>
           <a:prstGeom prst="roundRect"/>
           <a:solidFill>
@@ -11832,6 +12152,234 @@
           </a:solidFill>
         </p:spPr>
       </p:pic>
+      <p:pic>
+        <p:nvPicPr>
+          <p:cNvPr id="83" name="그림 12" descr="C:/Users/Admin1/AppData/Roaming/PolarisOffice/ETemp/15444_16111816/fImage41143168467.png"/>
+          <p:cNvPicPr>
+            <a:picLocks noChangeAspect="1"/>
+          </p:cNvPicPr>
+          <p:nvPr/>
+        </p:nvPicPr>
+        <p:blipFill rotWithShape="1">
+          <a:blip r:embed="rId3" cstate="print">
+            <a:extLst>
+              <a:ext uri="{28A0092B-C50C-407E-A947-70E740481C1C}">
+                <a14:useLocalDpi xmlns:a14="http://schemas.microsoft.com/office/drawing/2010/main" val="0"/>
+              </a:ext>
+            </a:extLst>
+          </a:blip>
+          <a:stretch>
+            <a:fillRect/>
+          </a:stretch>
+        </p:blipFill>
+        <p:spPr>
+          <a:xfrm rot="0">
+            <a:off x="8080375" y="1421765"/>
+            <a:ext cx="2901950" cy="1272540"/>
+          </a:xfrm>
+          <a:prstGeom prst="roundRect"/>
+          <a:solidFill>
+            <a:srgbClr val="EDEDED"/>
+          </a:solidFill>
+        </p:spPr>
+      </p:pic>
+      <p:pic>
+        <p:nvPicPr>
+          <p:cNvPr id="84" name="그림 15" descr="C:/Users/Admin1/AppData/Roaming/PolarisOffice/ETemp/15444_16111816/fImage87093176334.png"/>
+          <p:cNvPicPr>
+            <a:picLocks noChangeAspect="1"/>
+          </p:cNvPicPr>
+          <p:nvPr/>
+        </p:nvPicPr>
+        <p:blipFill rotWithShape="1">
+          <a:blip r:embed="rId4" cstate="print">
+            <a:extLst>
+              <a:ext uri="{28A0092B-C50C-407E-A947-70E740481C1C}">
+                <a14:useLocalDpi xmlns:a14="http://schemas.microsoft.com/office/drawing/2010/main" val="0"/>
+              </a:ext>
+            </a:extLst>
+          </a:blip>
+          <a:stretch>
+            <a:fillRect/>
+          </a:stretch>
+        </p:blipFill>
+        <p:spPr>
+          <a:xfrm rot="0">
+            <a:off x="6819265" y="1424305"/>
+            <a:ext cx="1137285" cy="1288415"/>
+          </a:xfrm>
+          <a:prstGeom prst="roundRect"/>
+          <a:solidFill>
+            <a:srgbClr val="EDEDED"/>
+          </a:solidFill>
+        </p:spPr>
+      </p:pic>
+      <p:cxnSp>
+        <p:nvCxnSpPr>
+          <p:cNvPr id="85" name="도형 18"/>
+          <p:cNvCxnSpPr/>
+          <p:nvPr/>
+        </p:nvCxnSpPr>
+        <p:spPr>
+          <a:xfrm rot="0" flipH="1" flipV="1">
+            <a:off x="7498715" y="1496060"/>
+            <a:ext cx="690245" cy="574675"/>
+          </a:xfrm>
+          <a:prstGeom prst="straightConnector1"/>
+          <a:ln w="6350" cap="flat" cmpd="sng">
+            <a:prstDash/>
+            <a:headEnd type="none" w="med" len="med"/>
+            <a:tailEnd type="triangle" w="med" len="med"/>
+          </a:ln>
+        </p:spPr>
+        <p:style>
+          <a:lnRef idx="1">
+            <a:schemeClr val="accent1"/>
+          </a:lnRef>
+          <a:fillRef idx="0">
+            <a:schemeClr val="accent1"/>
+          </a:fillRef>
+          <a:effectRef idx="0">
+            <a:schemeClr val="accent1"/>
+          </a:effectRef>
+          <a:fontRef idx="minor">
+            <a:schemeClr val="tx1"/>
+          </a:fontRef>
+        </p:style>
+      </p:cxnSp>
+      <p:pic>
+        <p:nvPicPr>
+          <p:cNvPr id="86" name="그림 19" descr="C:/Users/Admin1/AppData/Roaming/PolarisOffice/ETemp/15444_16111816/fImage62203196500.png"/>
+          <p:cNvPicPr>
+            <a:picLocks noChangeAspect="1"/>
+          </p:cNvPicPr>
+          <p:nvPr/>
+        </p:nvPicPr>
+        <p:blipFill rotWithShape="1">
+          <a:blip r:embed="rId5" cstate="print">
+            <a:extLst>
+              <a:ext uri="{28A0092B-C50C-407E-A947-70E740481C1C}">
+                <a14:useLocalDpi xmlns:a14="http://schemas.microsoft.com/office/drawing/2010/main" val="0"/>
+              </a:ext>
+            </a:extLst>
+          </a:blip>
+          <a:stretch>
+            <a:fillRect/>
+          </a:stretch>
+        </p:blipFill>
+        <p:spPr>
+          <a:xfrm rot="0">
+            <a:off x="6814185" y="3931920"/>
+            <a:ext cx="4159885" cy="1489075"/>
+          </a:xfrm>
+          <a:prstGeom prst="roundRect"/>
+          <a:solidFill>
+            <a:srgbClr val="EDEDED"/>
+          </a:solidFill>
+        </p:spPr>
+      </p:pic>
+      <p:sp>
+        <p:nvSpPr>
+          <p:cNvPr id="87" name="텍스트 상자 22"/>
+          <p:cNvSpPr txBox="1">
+            <a:spLocks/>
+          </p:cNvSpPr>
+          <p:nvPr/>
+        </p:nvSpPr>
+        <p:spPr>
+          <a:xfrm rot="0">
+            <a:off x="6815455" y="5546090"/>
+            <a:ext cx="4163695" cy="647065"/>
+          </a:xfrm>
+          <a:prstGeom prst="rect"/>
+          <a:noFill/>
+          <a:ln w="0">
+            <a:noFill/>
+            <a:prstDash/>
+          </a:ln>
+        </p:spPr>
+        <p:txBody>
+          <a:bodyPr wrap="square" lIns="89535" tIns="46355" rIns="89535" bIns="46355" numCol="1" vert="horz" anchor="t">
+            <a:spAutoFit/>
+          </a:bodyPr>
+          <a:lstStyle/>
+          <a:p>
+            <a:pPr marL="0" indent="0" rtl="0" algn="l" defTabSz="914400" eaLnBrk="1" latinLnBrk="0" hangingPunct="1">
+              <a:buFontTx/>
+              <a:buNone/>
+            </a:pPr>
+            <a:r>
+              <a:rPr sz="1800" b="1">
+                <a:solidFill>
+                  <a:srgbClr val="0611F2"/>
+                </a:solidFill>
+                <a:latin typeface="맑은 고딕" charset="0"/>
+                <a:ea typeface="맑은 고딕" charset="0"/>
+              </a:rPr>
+              <a:t>4</a:t>
+            </a:r>
+            <a:r>
+              <a:rPr lang="ko-KR" sz="1800" b="1">
+                <a:solidFill>
+                  <a:srgbClr val="0611F2"/>
+                </a:solidFill>
+                <a:latin typeface="맑은 고딕" charset="0"/>
+                <a:ea typeface="맑은 고딕" charset="0"/>
+              </a:rPr>
+              <a:t>2</a:t>
+            </a:r>
+            <a:r>
+              <a:rPr sz="1800" b="1">
+                <a:solidFill>
+                  <a:srgbClr val="0611F2"/>
+                </a:solidFill>
+                <a:latin typeface="맑은 고딕" charset="0"/>
+                <a:ea typeface="맑은 고딕" charset="0"/>
+              </a:rPr>
+              <a:t>.</a:t>
+            </a:r>
+            <a:r>
+              <a:rPr sz="1800">
+                <a:latin typeface="맑은 고딕" charset="0"/>
+                <a:ea typeface="맑은 고딕" charset="0"/>
+              </a:rPr>
+              <a:t> </a:t>
+            </a:r>
+            <a:r>
+              <a:rPr lang="ko-KR" sz="1800">
+                <a:latin typeface="맑은 고딕" charset="0"/>
+                <a:ea typeface="맑은 고딕" charset="0"/>
+              </a:rPr>
+              <a:t>그</a:t>
+            </a:r>
+            <a:r>
+              <a:rPr lang="ko-KR" sz="1800">
+                <a:latin typeface="맑은 고딕" charset="0"/>
+                <a:ea typeface="맑은 고딕" charset="0"/>
+              </a:rPr>
+              <a:t>다음</a:t>
+            </a:r>
+            <a:r>
+              <a:rPr lang="ko-KR" sz="1800">
+                <a:latin typeface="맑은 고딕" charset="0"/>
+                <a:ea typeface="맑은 고딕" charset="0"/>
+              </a:rPr>
+              <a:t> Character 오브젝트에 </a:t>
+            </a:r>
+            <a:r>
+              <a:rPr lang="ko-KR" sz="1800">
+                <a:latin typeface="맑은 고딕" charset="0"/>
+                <a:ea typeface="맑은 고딕" charset="0"/>
+              </a:rPr>
+              <a:t>Capsule Collider를 추가합니다.</a:t>
+            </a:r>
+            <a:endParaRPr lang="ko-KR" altLang="en-US" sz="1800">
+              <a:latin typeface="맑은 고딕" charset="0"/>
+              <a:ea typeface="맑은 고딕" charset="0"/>
+            </a:endParaRPr>
+          </a:p>
+        </p:txBody>
+      </p:sp>
     </p:spTree>
   </p:cSld>
   <p:clrMapOvr>
@@ -11918,7 +12466,7 @@
       </p:sp>
       <p:pic>
         <p:nvPicPr>
-          <p:cNvPr id="30" name="그림 18"/>
+          <p:cNvPr id="30" name="그림 18" descr="C:/Users/Admin1/AppData/Roaming/PolarisOffice/ETemp/15444_16111816/fImage58051529169.png"/>
           <p:cNvPicPr>
             <a:picLocks noChangeAspect="1"/>
           </p:cNvPicPr>
@@ -11939,7 +12487,7 @@
         <p:spPr>
           <a:xfrm rot="0">
             <a:off x="1496695" y="1412875"/>
-            <a:ext cx="3875405" cy="1304290"/>
+            <a:ext cx="3876040" cy="1455420"/>
           </a:xfrm>
           <a:prstGeom prst="roundRect"/>
           <a:solidFill>
@@ -11956,9 +12504,9 @@
           <p:nvPr/>
         </p:nvSpPr>
         <p:spPr>
-          <a:xfrm>
-            <a:off x="1490980" y="2893695"/>
-            <a:ext cx="3872865" cy="3169285"/>
+          <a:xfrm rot="0">
+            <a:off x="1499235" y="2993390"/>
+            <a:ext cx="3873500" cy="3169920"/>
           </a:xfrm>
           <a:prstGeom prst="rect"/>
           <a:noFill/>
@@ -11985,17 +12533,7 @@
                 <a:latin typeface="맑은 고딕" charset="0"/>
                 <a:ea typeface="맑은 고딕" charset="0"/>
               </a:rPr>
-              <a:t>4</a:t>
-            </a:r>
-            <a:r>
-              <a:rPr sz="2000" b="1">
-                <a:solidFill>
-                  <a:srgbClr val="0611F2"/>
-                </a:solidFill>
-                <a:latin typeface="맑은 고딕" charset="0"/>
-                <a:ea typeface="맑은 고딕" charset="0"/>
-              </a:rPr>
-              <a:t>. </a:t>
+              <a:t>4. </a:t>
             </a:r>
             <a:r>
               <a:rPr sz="1800">
@@ -12009,14 +12547,7 @@
                 <a:latin typeface="맑은 고딕" charset="0"/>
                 <a:ea typeface="맑은 고딕" charset="0"/>
               </a:rPr>
-              <a:t>음</a:t>
-            </a:r>
-            <a:r>
-              <a:rPr lang="ko-KR" sz="1800">
-                <a:latin typeface="맑은 고딕" charset="0"/>
-                <a:ea typeface="맑은 고딕" charset="0"/>
-              </a:rPr>
-              <a:t> Character 오브젝트에 Photon Transform View 컴포넌트를 추가힙니다. </a:t>
+              <a:t>음 Character 오브젝트에 Photon Transform View 컴포넌트를 추가힙니다. </a:t>
             </a:r>
             <a:endParaRPr lang="ko-KR" altLang="en-US" sz="1800">
               <a:latin typeface="맑은 고딕" charset="0"/>
@@ -12180,17 +12711,17 @@
       </p:sp>
       <p:pic>
         <p:nvPicPr>
-          <p:cNvPr id="36" name="그림 17"/>
+          <p:cNvPr id="36" name="그림 17" descr="C:/Users/Admin1/AppData/Roaming/PolarisOffice/ETemp/15444_16111816/fImage120802301478.png"/>
           <p:cNvPicPr>
             <a:picLocks noChangeAspect="1"/>
           </p:cNvPicPr>
           <p:nvPr/>
         </p:nvPicPr>
         <p:blipFill rotWithShape="1">
-          <a:blip r:embed="rId11" cstate="print">
+          <a:blip r:embed="rId11" cstate="hqprint">
             <a:extLst>
               <a:ext uri="{28A0092B-C50C-407E-A947-70E740481C1C}">
-                <a14:useLocalDpi xmlns:a14="http://schemas.microsoft.com/office/drawing/2010/main" val="0"/>
+                <a14:useLocalDpi xmlns:a14="http://schemas.microsoft.com/office/drawing/2010/main"/>
               </a:ext>
             </a:extLst>
           </a:blip>
@@ -12201,7 +12732,7 @@
         <p:spPr>
           <a:xfrm rot="0">
             <a:off x="6816725" y="1404620"/>
-            <a:ext cx="1397000" cy="1314450"/>
+            <a:ext cx="1272540" cy="1315085"/>
           </a:xfrm>
           <a:prstGeom prst="roundRect"/>
           <a:solidFill>
@@ -12211,17 +12742,17 @@
       </p:pic>
       <p:pic>
         <p:nvPicPr>
-          <p:cNvPr id="37" name="그림 19"/>
+          <p:cNvPr id="37" name="그림 19" descr="C:/Users/Admin1/AppData/Roaming/PolarisOffice/ETemp/15444_16111816/fImage121462319358.png"/>
           <p:cNvPicPr>
             <a:picLocks noChangeAspect="1"/>
           </p:cNvPicPr>
           <p:nvPr/>
         </p:nvPicPr>
         <p:blipFill rotWithShape="1">
-          <a:blip r:embed="rId12" cstate="print">
+          <a:blip r:embed="rId12" cstate="hqprint">
             <a:extLst>
               <a:ext uri="{28A0092B-C50C-407E-A947-70E740481C1C}">
-                <a14:useLocalDpi xmlns:a14="http://schemas.microsoft.com/office/drawing/2010/main" val="0"/>
+                <a14:useLocalDpi xmlns:a14="http://schemas.microsoft.com/office/drawing/2010/main"/>
               </a:ext>
             </a:extLst>
           </a:blip>
@@ -12231,8 +12762,8 @@
         </p:blipFill>
         <p:spPr>
           <a:xfrm rot="0">
-            <a:off x="8346440" y="1412875"/>
-            <a:ext cx="2619375" cy="1314450"/>
+            <a:off x="8221345" y="1412875"/>
+            <a:ext cx="2745105" cy="1315085"/>
           </a:xfrm>
           <a:prstGeom prst="roundRect"/>
           <a:solidFill>
@@ -12312,8 +12843,8 @@
         </p:nvSpPr>
         <p:spPr>
           <a:xfrm rot="0">
-            <a:off x="6813550" y="5381625"/>
-            <a:ext cx="4140835" cy="677545"/>
+            <a:off x="6813550" y="5489575"/>
+            <a:ext cx="4141470" cy="678180"/>
           </a:xfrm>
           <a:prstGeom prst="rect"/>
           <a:noFill/>
@@ -12364,28 +12895,14 @@
                 <a:latin typeface="맑은 고딕" charset="0"/>
                 <a:ea typeface="맑은 고딕" charset="0"/>
               </a:rPr>
-              <a:t> </a:t>
-            </a:r>
-            <a:r>
-              <a:rPr sz="1800">
-                <a:latin typeface="맑은 고딕" charset="0"/>
-                <a:ea typeface="맑은 고딕" charset="0"/>
-              </a:rPr>
-              <a:t>c</a:t>
+              <a:t> c</a:t>
             </a:r>
             <a:r>
               <a:rPr lang="ko-KR" sz="1800">
                 <a:latin typeface="맑은 고딕" charset="0"/>
                 <a:ea typeface="맑은 고딕" charset="0"/>
               </a:rPr>
-              <a:t>haracter</a:t>
-            </a:r>
-            <a:r>
-              <a:rPr lang="ko-KR" sz="1800">
-                <a:latin typeface="맑은 고딕" charset="0"/>
-                <a:ea typeface="맑은 고딕" charset="0"/>
-              </a:rPr>
-              <a:t> 오브젝트를 Resources 폴더에 넣어줍니다.</a:t>
+              <a:t>haracter 오브젝트를 Resources 폴더에 넣어줍니다.</a:t>
             </a:r>
             <a:endParaRPr lang="ko-KR" altLang="en-US" sz="1800">
               <a:latin typeface="맑은 고딕" charset="0"/>
@@ -13062,8 +13579,8 @@
         </p:nvSpPr>
         <p:spPr>
           <a:xfrm rot="0">
-            <a:off x="1238885" y="3263265"/>
-            <a:ext cx="4142740" cy="2892425"/>
+            <a:off x="1238885" y="3354705"/>
+            <a:ext cx="4143375" cy="2893060"/>
           </a:xfrm>
           <a:prstGeom prst="rect"/>
           <a:noFill/>
@@ -13107,21 +13624,7 @@
                 <a:latin typeface="맑은 고딕" charset="0"/>
                 <a:ea typeface="맑은 고딕" charset="0"/>
               </a:rPr>
-              <a:t>그리고 Photon</a:t>
-            </a:r>
-            <a:r>
-              <a:rPr lang="ko-KR" sz="1800">
-                <a:latin typeface="맑은 고딕" charset="0"/>
-                <a:ea typeface="맑은 고딕" charset="0"/>
-              </a:rPr>
-              <a:t>System</a:t>
-            </a:r>
-            <a:r>
-              <a:rPr lang="ko-KR" sz="1800">
-                <a:latin typeface="맑은 고딕" charset="0"/>
-                <a:ea typeface="맑은 고딕" charset="0"/>
-              </a:rPr>
-              <a:t> 스크립트는 MonoBehaviourPun 클래스를 상속받도록 설정합니다.</a:t>
+              <a:t>그리고 PhotonSystem 스크립트는 MonoBehaviourPun 클래스를 상속받도록 설정합니다.</a:t>
             </a:r>
             <a:endParaRPr lang="ko-KR" altLang="en-US" sz="1800">
               <a:latin typeface="맑은 고딕" charset="0"/>
@@ -13194,8 +13697,8 @@
         </p:nvSpPr>
         <p:spPr>
           <a:xfrm rot="0">
-            <a:off x="6840855" y="4366260"/>
-            <a:ext cx="4116705" cy="1784985"/>
+            <a:off x="6824345" y="4457700"/>
+            <a:ext cx="4124325" cy="1784985"/>
           </a:xfrm>
           <a:prstGeom prst="rect"/>
           <a:noFill/>
@@ -13222,17 +13725,7 @@
                 <a:latin typeface="맑은 고딕" charset="0"/>
                 <a:ea typeface="맑은 고딕" charset="0"/>
               </a:rPr>
-              <a:t>1</a:t>
-            </a:r>
-            <a:r>
-              <a:rPr lang="ko-KR" sz="2000" b="1">
-                <a:solidFill>
-                  <a:srgbClr val="0611F2"/>
-                </a:solidFill>
-                <a:latin typeface="맑은 고딕" charset="0"/>
-                <a:ea typeface="맑은 고딕" charset="0"/>
-              </a:rPr>
-              <a:t>1</a:t>
+              <a:t>11</a:t>
             </a:r>
             <a:r>
               <a:rPr sz="2000" b="1">
@@ -13287,17 +13780,17 @@
       </p:sp>
       <p:pic>
         <p:nvPicPr>
-          <p:cNvPr id="46" name="그림 43"/>
+          <p:cNvPr id="46" name="그림 43" descr="C:/Users/Admin1/AppData/Roaming/PolarisOffice/ETemp/15444_16111816/fImage71392429961.png"/>
           <p:cNvPicPr>
             <a:picLocks noChangeAspect="1"/>
           </p:cNvPicPr>
           <p:nvPr/>
         </p:nvPicPr>
         <p:blipFill rotWithShape="1">
-          <a:blip r:embed="rId5" cstate="print">
+          <a:blip r:embed="rId5" cstate="hqprint">
             <a:extLst>
               <a:ext uri="{28A0092B-C50C-407E-A947-70E740481C1C}">
-                <a14:useLocalDpi xmlns:a14="http://schemas.microsoft.com/office/drawing/2010/main" val="0"/>
+                <a14:useLocalDpi xmlns:a14="http://schemas.microsoft.com/office/drawing/2010/main"/>
               </a:ext>
             </a:extLst>
           </a:blip>
@@ -13308,27 +13801,25 @@
         <p:spPr>
           <a:xfrm rot="0">
             <a:off x="1238885" y="1394460"/>
-            <a:ext cx="4135755" cy="1723390"/>
-          </a:xfrm>
-          <a:prstGeom prst="roundRect"/>
-          <a:solidFill>
-            <a:srgbClr val="EDEDED"/>
-          </a:solidFill>
+            <a:ext cx="4136390" cy="1848485"/>
+          </a:xfrm>
+          <a:prstGeom prst="rect"/>
+          <a:noFill/>
         </p:spPr>
       </p:pic>
       <p:pic>
         <p:nvPicPr>
-          <p:cNvPr id="47" name="그림 47"/>
+          <p:cNvPr id="47" name="그림 47" descr="C:/Users/Admin1/AppData/Roaming/PolarisOffice/ETemp/15444_16111816/fImage6758244491.png"/>
           <p:cNvPicPr>
             <a:picLocks noChangeAspect="1"/>
           </p:cNvPicPr>
           <p:nvPr/>
         </p:nvPicPr>
         <p:blipFill rotWithShape="1">
-          <a:blip r:embed="rId6" cstate="print">
+          <a:blip r:embed="rId6" cstate="hqprint">
             <a:extLst>
               <a:ext uri="{28A0092B-C50C-407E-A947-70E740481C1C}">
-                <a14:useLocalDpi xmlns:a14="http://schemas.microsoft.com/office/drawing/2010/main" val="0"/>
+                <a14:useLocalDpi xmlns:a14="http://schemas.microsoft.com/office/drawing/2010/main"/>
               </a:ext>
             </a:extLst>
           </a:blip>
@@ -13339,12 +13830,10 @@
         <p:spPr>
           <a:xfrm rot="0">
             <a:off x="6833235" y="1405890"/>
-            <a:ext cx="4115435" cy="2834640"/>
-          </a:xfrm>
-          <a:prstGeom prst="roundRect"/>
-          <a:solidFill>
-            <a:srgbClr val="EDEDED"/>
-          </a:solidFill>
+            <a:ext cx="4116070" cy="2875915"/>
+          </a:xfrm>
+          <a:prstGeom prst="rect"/>
+          <a:noFill/>
         </p:spPr>
       </p:pic>
     </p:spTree>
@@ -13447,9 +13936,9 @@
           <p:nvPr/>
         </p:nvSpPr>
         <p:spPr>
-          <a:xfrm>
-            <a:off x="1454785" y="4135120"/>
-            <a:ext cx="3910330" cy="2061845"/>
+          <a:xfrm rot="0">
+            <a:off x="1230630" y="4201795"/>
+            <a:ext cx="4135120" cy="2061845"/>
           </a:xfrm>
           <a:prstGeom prst="rect"/>
           <a:noFill/>
@@ -13520,14 +14009,7 @@
                 <a:latin typeface="맑은 고딕" charset="0"/>
                 <a:ea typeface="맑은 고딕" charset="0"/>
               </a:rPr>
-              <a:t>그리고</a:t>
-            </a:r>
-            <a:r>
-              <a:rPr lang="ko-KR" sz="1800">
-                <a:latin typeface="맑은 고딕" charset="0"/>
-                <a:ea typeface="맑은 고딕" charset="0"/>
-              </a:rPr>
-              <a:t> 키 입력과 마우스 회전에 따라 오브젝트가 이동 및 회전할 수 있도록 설정합니다.</a:t>
+              <a:t>그리고 키 입력과 마우스 회전에 따라 오브젝트가 이동 및 회전할 수 있도록 설정합니다.</a:t>
             </a:r>
             <a:endParaRPr lang="ko-KR" altLang="en-US" sz="1800">
               <a:latin typeface="맑은 고딕" charset="0"/>
@@ -13538,17 +14020,17 @@
       </p:sp>
       <p:pic>
         <p:nvPicPr>
-          <p:cNvPr id="32" name="그림 57"/>
+          <p:cNvPr id="32" name="그림 57" descr="C:/Users/Admin1/AppData/Roaming/PolarisOffice/ETemp/15444_16111816/fImage101552502995.png"/>
           <p:cNvPicPr>
             <a:picLocks noChangeAspect="1"/>
           </p:cNvPicPr>
           <p:nvPr/>
         </p:nvPicPr>
         <p:blipFill rotWithShape="1">
-          <a:blip r:embed="rId8" cstate="print">
+          <a:blip r:embed="rId8" cstate="hqprint">
             <a:extLst>
               <a:ext uri="{28A0092B-C50C-407E-A947-70E740481C1C}">
-                <a14:useLocalDpi xmlns:a14="http://schemas.microsoft.com/office/drawing/2010/main" val="0"/>
+                <a14:useLocalDpi xmlns:a14="http://schemas.microsoft.com/office/drawing/2010/main"/>
               </a:ext>
             </a:extLst>
           </a:blip>
@@ -13558,13 +14040,11 @@
         </p:blipFill>
         <p:spPr>
           <a:xfrm rot="0">
-            <a:off x="1454785" y="1446530"/>
-            <a:ext cx="3907790" cy="2593975"/>
-          </a:xfrm>
-          <a:prstGeom prst="roundRect"/>
-          <a:solidFill>
-            <a:srgbClr val="EDEDED"/>
-          </a:solidFill>
+            <a:off x="1238885" y="1438275"/>
+            <a:ext cx="4124325" cy="2602865"/>
+          </a:xfrm>
+          <a:prstGeom prst="rect"/>
+          <a:noFill/>
         </p:spPr>
       </p:pic>
       <p:sp>
@@ -13667,7 +14147,7 @@
       </p:sp>
       <p:pic>
         <p:nvPicPr>
-          <p:cNvPr id="34" name="그림 63"/>
+          <p:cNvPr id="34" name="그림 63" descr="C:/Users/Admin1/AppData/Roaming/PolarisOffice/ETemp/15444_16111816/fImage61771851478.png"/>
           <p:cNvPicPr>
             <a:picLocks noChangeAspect="1"/>
           </p:cNvPicPr>
@@ -13688,12 +14168,10 @@
         <p:spPr>
           <a:xfrm rot="0">
             <a:off x="6833235" y="1437640"/>
-            <a:ext cx="4124325" cy="2353945"/>
-          </a:xfrm>
-          <a:prstGeom prst="roundRect"/>
-          <a:solidFill>
-            <a:srgbClr val="EDEDED"/>
-          </a:solidFill>
+            <a:ext cx="4115435" cy="2354580"/>
+          </a:xfrm>
+          <a:prstGeom prst="rect"/>
+          <a:noFill/>
         </p:spPr>
       </p:pic>
     </p:spTree>
@@ -13797,8 +14275,8 @@
         </p:nvSpPr>
         <p:spPr>
           <a:xfrm rot="0">
-            <a:off x="1263650" y="4519295"/>
-            <a:ext cx="4112260" cy="1784985"/>
+            <a:off x="1229995" y="4519295"/>
+            <a:ext cx="4146550" cy="1784985"/>
           </a:xfrm>
           <a:prstGeom prst="rect"/>
           <a:noFill/>
@@ -13808,7 +14286,7 @@
           </a:ln>
         </p:spPr>
         <p:txBody>
-          <a:bodyPr wrap="square" lIns="89535" tIns="46355" rIns="89535" bIns="46355" vert="horz" anchor="t">
+          <a:bodyPr wrap="square" lIns="89535" tIns="46355" rIns="89535" bIns="46355" numCol="1" vert="horz" anchor="t">
             <a:spAutoFit/>
           </a:bodyPr>
           <a:lstStyle/>
@@ -13825,17 +14303,7 @@
                 <a:latin typeface="맑은 고딕" charset="0"/>
                 <a:ea typeface="맑은 고딕" charset="0"/>
               </a:rPr>
-              <a:t>14</a:t>
-            </a:r>
-            <a:r>
-              <a:rPr sz="2000" b="1">
-                <a:solidFill>
-                  <a:srgbClr val="0611F2"/>
-                </a:solidFill>
-                <a:latin typeface="맑은 고딕" charset="0"/>
-                <a:ea typeface="맑은 고딕" charset="0"/>
-              </a:rPr>
-              <a:t>. </a:t>
+              <a:t>14. </a:t>
             </a:r>
             <a:r>
               <a:rPr sz="1800">
@@ -13883,14 +14351,7 @@
                 <a:latin typeface="맑은 고딕" charset="0"/>
                 <a:ea typeface="맑은 고딕" charset="0"/>
               </a:rPr>
-              <a:t>를 검색하고</a:t>
-            </a:r>
-            <a:r>
-              <a:rPr sz="1800">
-                <a:latin typeface="맑은 고딕" charset="0"/>
-                <a:ea typeface="맑은 고딕" charset="0"/>
-              </a:rPr>
-              <a:t> </a:t>
+              <a:t>를 검색하고 </a:t>
             </a:r>
             <a:r>
               <a:rPr lang="ko-KR" sz="1800">
@@ -13915,7 +14376,7 @@
       </p:sp>
       <p:pic>
         <p:nvPicPr>
-          <p:cNvPr id="29" name="그림 2" descr="C:/Users/Admin1/AppData/Roaming/PolarisOffice/ETemp/7276_13419048/fImage1104821541.png"/>
+          <p:cNvPr id="29" name="그림 2" descr="C:/Users/Admin1/AppData/Roaming/PolarisOffice/ETemp/15444_16111816/fImage1104821541.png"/>
           <p:cNvPicPr>
             <a:picLocks noChangeAspect="1"/>
           </p:cNvPicPr>
@@ -13935,8 +14396,8 @@
         </p:blipFill>
         <p:spPr>
           <a:xfrm rot="0">
-            <a:off x="1263650" y="1361440"/>
-            <a:ext cx="1954530" cy="3002915"/>
+            <a:off x="1238885" y="1361440"/>
+            <a:ext cx="1979930" cy="3003550"/>
           </a:xfrm>
           <a:prstGeom prst="rect"/>
           <a:noFill/>
@@ -13944,7 +14405,7 @@
       </p:pic>
       <p:pic>
         <p:nvPicPr>
-          <p:cNvPr id="30" name="그림 4" descr="C:/Users/Admin1/AppData/Roaming/PolarisOffice/ETemp/7276_13419048/fImage441292178467.png"/>
+          <p:cNvPr id="30" name="그림 4"/>
           <p:cNvPicPr>
             <a:picLocks noChangeAspect="1"/>
           </p:cNvPicPr>
@@ -13973,7 +14434,7 @@
       </p:pic>
       <p:pic>
         <p:nvPicPr>
-          <p:cNvPr id="31" name="그림 7" descr="C:/Users/Admin1/AppData/Roaming/PolarisOffice/ETemp/7276_13419048/fImage3449292186334.png"/>
+          <p:cNvPr id="31" name="그림 7"/>
           <p:cNvPicPr>
             <a:picLocks noChangeAspect="1"/>
           </p:cNvPicPr>
@@ -14105,7 +14566,7 @@
 </file>
 
 <file path=ppt/slides/slide7.xml><?xml version="1.0" encoding="utf-8"?>
-<p:sld xmlns:a="http://schemas.openxmlformats.org/drawingml/2006/main" xmlns:r="http://schemas.openxmlformats.org/officeDocument/2006/relationships" xmlns:p="http://schemas.openxmlformats.org/presentationml/2006/main">
+<p:sld xmlns:a="http://schemas.openxmlformats.org/drawingml/2006/main" xmlns:r="http://schemas.openxmlformats.org/officeDocument/2006/relationships" xmlns:p="http://schemas.openxmlformats.org/presentationml/2006/main" xmlns:p14="http://schemas.microsoft.com/office/powerpoint/2010/main">
   <p:cSld>
     <p:spTree>
       <p:nvGrpSpPr>
@@ -14252,7 +14713,7 @@
       </p:sp>
       <p:pic>
         <p:nvPicPr>
-          <p:cNvPr id="33" name="그림 13" descr="C:/Users/Admin1/AppData/Roaming/PolarisOffice/ETemp/7276_13419048/fImage403863016500.png"/>
+          <p:cNvPr id="33" name="그림 13"/>
           <p:cNvPicPr>
             <a:picLocks noChangeAspect="1"/>
           </p:cNvPicPr>
@@ -14281,7 +14742,7 @@
       </p:pic>
       <p:pic>
         <p:nvPicPr>
-          <p:cNvPr id="34" name="그림 15" descr="C:/Users/Admin1/AppData/Roaming/PolarisOffice/ETemp/7276_13419048/fImage69113029169.png"/>
+          <p:cNvPr id="34" name="그림 15"/>
           <p:cNvPicPr>
             <a:picLocks noChangeAspect="1"/>
           </p:cNvPicPr>
@@ -14312,7 +14773,7 @@
       </p:pic>
       <p:pic>
         <p:nvPicPr>
-          <p:cNvPr id="35" name="그림 18" descr="C:/Users/Admin1/AppData/Roaming/PolarisOffice/ETemp/7276_13419048/fImage58853035724.png"/>
+          <p:cNvPr id="35" name="그림 18"/>
           <p:cNvPicPr>
             <a:picLocks noChangeAspect="1"/>
           </p:cNvPicPr>
@@ -14438,7 +14899,7 @@
       </p:sp>
       <p:pic>
         <p:nvPicPr>
-          <p:cNvPr id="37" name="그림 23" descr="C:/Users/Admin1/AppData/Roaming/PolarisOffice/ETemp/7276_13419048/fImage43693061478.png"/>
+          <p:cNvPr id="37" name="그림 23"/>
           <p:cNvPicPr>
             <a:picLocks noChangeAspect="1"/>
           </p:cNvPicPr>
@@ -14913,7 +15374,7 @@
       </p:sp>
       <p:pic>
         <p:nvPicPr>
-          <p:cNvPr id="33" name="그림 31" descr="C:/Users/Admin1/AppData/Roaming/PolarisOffice/ETemp/7276_13419048/fImage330252146500.png"/>
+          <p:cNvPr id="33" name="그림 31"/>
           <p:cNvPicPr>
             <a:picLocks noChangeAspect="1"/>
           </p:cNvPicPr>
@@ -15073,7 +15534,7 @@
       </p:sp>
       <p:pic>
         <p:nvPicPr>
-          <p:cNvPr id="36" name="그림 45" descr="C:/Users/Admin1/AppData/Roaming/PolarisOffice/ETemp/7276_13419048/fImage57722359169.png"/>
+          <p:cNvPr id="36" name="그림 45"/>
           <p:cNvPicPr>
             <a:picLocks noChangeAspect="1"/>
           </p:cNvPicPr>
@@ -15104,7 +15565,7 @@
       </p:pic>
       <p:pic>
         <p:nvPicPr>
-          <p:cNvPr id="37" name="그림 29" descr="C:/Users/Admin1/AppData/Roaming/PolarisOffice/ETemp/7276_13419048/fImage71093089358.png"/>
+          <p:cNvPr id="37" name="그림 29"/>
           <p:cNvPicPr>
             <a:picLocks noChangeAspect="1"/>
           </p:cNvPicPr>
@@ -15234,8 +15695,8 @@
         </p:nvSpPr>
         <p:spPr>
           <a:xfrm rot="0">
-            <a:off x="1254125" y="4678680"/>
-            <a:ext cx="4118610" cy="1477645"/>
+            <a:off x="1255395" y="4678680"/>
+            <a:ext cx="4117975" cy="1477645"/>
           </a:xfrm>
           <a:prstGeom prst="rect"/>
           <a:noFill/>
@@ -15262,17 +15723,7 @@
                 <a:latin typeface="맑은 고딕" charset="0"/>
                 <a:ea typeface="맑은 고딕" charset="0"/>
               </a:rPr>
-              <a:t>22</a:t>
-            </a:r>
-            <a:r>
-              <a:rPr sz="1800" b="1">
-                <a:solidFill>
-                  <a:srgbClr val="0611F2"/>
-                </a:solidFill>
-                <a:latin typeface="맑은 고딕" charset="0"/>
-                <a:ea typeface="맑은 고딕" charset="0"/>
-              </a:rPr>
-              <a:t>.</a:t>
+              <a:t>22.</a:t>
             </a:r>
             <a:r>
               <a:rPr sz="1800">
@@ -15320,14 +15771,7 @@
                 <a:latin typeface="맑은 고딕" charset="0"/>
                 <a:ea typeface="맑은 고딕" charset="0"/>
               </a:rPr>
-              <a:t>그다음</a:t>
-            </a:r>
-            <a:r>
-              <a:rPr sz="1800">
-                <a:latin typeface="맑은 고딕" charset="0"/>
-                <a:ea typeface="맑은 고딕" charset="0"/>
-              </a:rPr>
-              <a:t>으</a:t>
+              <a:t>그다음으</a:t>
             </a:r>
             <a:r>
               <a:rPr lang="ko-KR" sz="1800">
@@ -15490,7 +15934,7 @@
       </p:pic>
       <p:pic>
         <p:nvPicPr>
-          <p:cNvPr id="34" name="그림 53" descr="C:/Users/Admin1/AppData/Roaming/PolarisOffice/ETemp/7276_13419048/fImage47782419358.png"/>
+          <p:cNvPr id="34" name="그림 53" descr="C:/Users/Admin1/AppData/Roaming/PolarisOffice/ETemp/15444_16111816/fImage47782419358.png"/>
           <p:cNvPicPr>
             <a:picLocks noChangeAspect="1"/>
           </p:cNvPicPr>
@@ -15510,8 +15954,8 @@
         </p:blipFill>
         <p:spPr>
           <a:xfrm rot="0">
-            <a:off x="6800850" y="4000500"/>
-            <a:ext cx="4265295" cy="1096010"/>
+            <a:off x="6800850" y="3992245"/>
+            <a:ext cx="4265930" cy="1096645"/>
           </a:xfrm>
           <a:prstGeom prst="roundRect"/>
           <a:solidFill>
@@ -15529,8 +15973,8 @@
         </p:nvSpPr>
         <p:spPr>
           <a:xfrm rot="0">
-            <a:off x="6805295" y="5231130"/>
-            <a:ext cx="4253865" cy="923925"/>
+            <a:off x="6813550" y="5231130"/>
+            <a:ext cx="4254500" cy="924560"/>
           </a:xfrm>
           <a:prstGeom prst="rect"/>
           <a:noFill/>
@@ -15557,17 +16001,7 @@
                 <a:latin typeface="맑은 고딕" charset="0"/>
                 <a:ea typeface="맑은 고딕" charset="0"/>
               </a:rPr>
-              <a:t>24</a:t>
-            </a:r>
-            <a:r>
-              <a:rPr sz="1800" b="1">
-                <a:solidFill>
-                  <a:srgbClr val="0611F2"/>
-                </a:solidFill>
-                <a:latin typeface="맑은 고딕" charset="0"/>
-                <a:ea typeface="맑은 고딕" charset="0"/>
-              </a:rPr>
-              <a:t>.</a:t>
+              <a:t>24.</a:t>
             </a:r>
             <a:r>
               <a:rPr sz="1800">
@@ -15581,14 +16015,7 @@
                 <a:latin typeface="맑은 고딕" charset="0"/>
                 <a:ea typeface="맑은 고딕" charset="0"/>
               </a:rPr>
-              <a:t>그리고</a:t>
-            </a:r>
-            <a:r>
-              <a:rPr lang="ko-KR" sz="1800">
-                <a:latin typeface="맑은 고딕" charset="0"/>
-                <a:ea typeface="맑은 고딕" charset="0"/>
-              </a:rPr>
-              <a:t> Network Voice Manager 오브젝트에 Recorder 컴포넌트를 추가합니다.</a:t>
+              <a:t>그리고 Network Voice Manager 오브젝트에 Recorder 컴포넌트를 추가합니다.</a:t>
             </a:r>
             <a:endParaRPr lang="ko-KR" altLang="en-US" sz="1800">
               <a:latin typeface="맑은 고딕" charset="0"/>

</xml_diff>

<commit_message>
Update photon SDK files
- Photon PUN 2 data update

- Resolves an issue where rooms
  were not created due to multiple
  lobbies access issues due to
  multiple scripts

- Update photon data management
  material
</commit_message>
<xml_diff>
--- a/Assets/Class/Photon Server/PPT Data/Photon Synchronization.pptx
+++ b/Assets/Class/Photon Server/PPT Data/Photon Synchronization.pptx
@@ -2,29 +2,29 @@
 <file path=ppt/presentation.xml><?xml version="1.0" encoding="utf-8"?>
 <p:presentation xmlns:a="http://schemas.openxmlformats.org/drawingml/2006/main" xmlns:r="http://schemas.openxmlformats.org/officeDocument/2006/relationships" xmlns:p="http://schemas.openxmlformats.org/presentationml/2006/main" xmlns:p14="http://schemas.microsoft.com/office/powerpoint/2010/main" saveSubsetFonts="1" firstSlideNum="0">
   <p:sldMasterIdLst>
-    <p:sldMasterId id="2147486898" r:id="rId12"/>
+    <p:sldMasterId id="2147486899" r:id="rId12"/>
   </p:sldMasterIdLst>
   <p:notesMasterIdLst>
     <p:notesMasterId r:id="rId14"/>
   </p:notesMasterIdLst>
   <p:sldIdLst>
     <p:sldId id="309" r:id="rId16"/>
-    <p:sldId id="307" r:id="rId17"/>
-    <p:sldId id="310" r:id="rId18"/>
-    <p:sldId id="311" r:id="rId19"/>
-    <p:sldId id="312" r:id="rId20"/>
-    <p:sldId id="313" r:id="rId21"/>
-    <p:sldId id="323" r:id="rId22"/>
-    <p:sldId id="314" r:id="rId23"/>
-    <p:sldId id="315" r:id="rId24"/>
-    <p:sldId id="316" r:id="rId25"/>
-    <p:sldId id="317" r:id="rId26"/>
-    <p:sldId id="318" r:id="rId27"/>
-    <p:sldId id="319" r:id="rId28"/>
-    <p:sldId id="320" r:id="rId29"/>
-    <p:sldId id="321" r:id="rId30"/>
-    <p:sldId id="322" r:id="rId31"/>
-    <p:sldId id="324" r:id="rId32"/>
+    <p:sldId id="307" r:id="rId18"/>
+    <p:sldId id="310" r:id="rId20"/>
+    <p:sldId id="311" r:id="rId22"/>
+    <p:sldId id="312" r:id="rId23"/>
+    <p:sldId id="313" r:id="rId25"/>
+    <p:sldId id="323" r:id="rId27"/>
+    <p:sldId id="314" r:id="rId29"/>
+    <p:sldId id="315" r:id="rId31"/>
+    <p:sldId id="316" r:id="rId33"/>
+    <p:sldId id="317" r:id="rId35"/>
+    <p:sldId id="318" r:id="rId37"/>
+    <p:sldId id="319" r:id="rId39"/>
+    <p:sldId id="320" r:id="rId41"/>
+    <p:sldId id="321" r:id="rId43"/>
+    <p:sldId id="322" r:id="rId45"/>
+    <p:sldId id="324" r:id="rId47"/>
   </p:sldIdLst>
   <p:sldSz cx="12192000" cy="6858000"/>
   <p:notesSz cx="6858000" cy="9144000"/>
@@ -13780,36 +13780,7 @@
       </p:sp>
       <p:pic>
         <p:nvPicPr>
-          <p:cNvPr id="46" name="그림 43" descr="C:/Users/Admin1/AppData/Roaming/PolarisOffice/ETemp/15444_16111816/fImage71392429961.png"/>
-          <p:cNvPicPr>
-            <a:picLocks noChangeAspect="1"/>
-          </p:cNvPicPr>
-          <p:nvPr/>
-        </p:nvPicPr>
-        <p:blipFill rotWithShape="1">
-          <a:blip r:embed="rId5" cstate="hqprint">
-            <a:extLst>
-              <a:ext uri="{28A0092B-C50C-407E-A947-70E740481C1C}">
-                <a14:useLocalDpi xmlns:a14="http://schemas.microsoft.com/office/drawing/2010/main"/>
-              </a:ext>
-            </a:extLst>
-          </a:blip>
-          <a:stretch>
-            <a:fillRect/>
-          </a:stretch>
-        </p:blipFill>
-        <p:spPr>
-          <a:xfrm rot="0">
-            <a:off x="1238885" y="1394460"/>
-            <a:ext cx="4136390" cy="1848485"/>
-          </a:xfrm>
-          <a:prstGeom prst="rect"/>
-          <a:noFill/>
-        </p:spPr>
-      </p:pic>
-      <p:pic>
-        <p:nvPicPr>
-          <p:cNvPr id="47" name="그림 47" descr="C:/Users/Admin1/AppData/Roaming/PolarisOffice/ETemp/15444_16111816/fImage6758244491.png"/>
+          <p:cNvPr id="47" name="그림 47" descr="C:/Users/Admin1/AppData/Roaming/PolarisOffice/ETemp/14060_13615360/fImage6758244491.png"/>
           <p:cNvPicPr>
             <a:picLocks noChangeAspect="1"/>
           </p:cNvPicPr>
@@ -13830,10 +13801,43 @@
         <p:spPr>
           <a:xfrm rot="0">
             <a:off x="6833235" y="1405890"/>
-            <a:ext cx="4116070" cy="2875915"/>
-          </a:xfrm>
-          <a:prstGeom prst="rect"/>
-          <a:noFill/>
+            <a:ext cx="4116705" cy="2876550"/>
+          </a:xfrm>
+          <a:prstGeom prst="roundRect"/>
+          <a:solidFill>
+            <a:srgbClr val="EDEDED"/>
+          </a:solidFill>
+        </p:spPr>
+      </p:pic>
+      <p:pic>
+        <p:nvPicPr>
+          <p:cNvPr id="48" name="그림 1" descr="C:/Users/Admin1/AppData/Roaming/PolarisOffice/ETemp/14060_13615360/fImage1238124541.png"/>
+          <p:cNvPicPr>
+            <a:picLocks noChangeAspect="1"/>
+          </p:cNvPicPr>
+          <p:nvPr/>
+        </p:nvPicPr>
+        <p:blipFill rotWithShape="1">
+          <a:blip r:embed="rId7" cstate="print">
+            <a:extLst>
+              <a:ext uri="{28A0092B-C50C-407E-A947-70E740481C1C}">
+                <a14:useLocalDpi xmlns:a14="http://schemas.microsoft.com/office/drawing/2010/main" val="0"/>
+              </a:ext>
+            </a:extLst>
+          </a:blip>
+          <a:stretch>
+            <a:fillRect/>
+          </a:stretch>
+        </p:blipFill>
+        <p:spPr>
+          <a:xfrm rot="0">
+            <a:off x="1230630" y="1407160"/>
+            <a:ext cx="4140200" cy="1868805"/>
+          </a:xfrm>
+          <a:prstGeom prst="roundRect"/>
+          <a:solidFill>
+            <a:srgbClr val="EDEDED"/>
+          </a:solidFill>
         </p:spPr>
       </p:pic>
     </p:spTree>

</xml_diff>